<commit_message>
slides updated - work in progress
</commit_message>
<xml_diff>
--- a/demo-win-container.pptx
+++ b/demo-win-container.pptx
@@ -5,10 +5,10 @@
     <p:sldMasterId id="2147483717" r:id="rId4"/>
   </p:sldMasterIdLst>
   <p:notesMasterIdLst>
-    <p:notesMasterId r:id="rId16"/>
+    <p:notesMasterId r:id="rId15"/>
   </p:notesMasterIdLst>
   <p:handoutMasterIdLst>
-    <p:handoutMasterId r:id="rId17"/>
+    <p:handoutMasterId r:id="rId16"/>
   </p:handoutMasterIdLst>
   <p:sldIdLst>
     <p:sldId id="290" r:id="rId5"/>
@@ -18,10 +18,9 @@
     <p:sldId id="294" r:id="rId9"/>
     <p:sldId id="265" r:id="rId10"/>
     <p:sldId id="295" r:id="rId11"/>
-    <p:sldId id="268" r:id="rId12"/>
-    <p:sldId id="270" r:id="rId13"/>
-    <p:sldId id="296" r:id="rId14"/>
-    <p:sldId id="283" r:id="rId15"/>
+    <p:sldId id="296" r:id="rId12"/>
+    <p:sldId id="268" r:id="rId13"/>
+    <p:sldId id="297" r:id="rId14"/>
   </p:sldIdLst>
   <p:sldSz cx="12188825" cy="7086600"/>
   <p:notesSz cx="6858000" cy="9144000"/>
@@ -599,845 +598,6 @@
     </pc:docChg>
   </pc:docChgLst>
 </pc:chgInfo>
-</file>
-
-<file path=ppt/charts/chart1.xml><?xml version="1.0" encoding="utf-8"?>
-<c:chartSpace xmlns:c="http://schemas.openxmlformats.org/drawingml/2006/chart" xmlns:a="http://schemas.openxmlformats.org/drawingml/2006/main" xmlns:r="http://schemas.openxmlformats.org/officeDocument/2006/relationships" xmlns:c16r2="http://schemas.microsoft.com/office/drawing/2015/06/chart">
-  <c:date1904 val="0"/>
-  <c:lang val="en-US"/>
-  <c:roundedCorners val="0"/>
-  <mc:AlternateContent xmlns:mc="http://schemas.openxmlformats.org/markup-compatibility/2006">
-    <mc:Choice xmlns:c14="http://schemas.microsoft.com/office/drawing/2007/8/2/chart" Requires="c14">
-      <c14:style val="101"/>
-    </mc:Choice>
-    <mc:Fallback>
-      <c:style val="1"/>
-    </mc:Fallback>
-  </mc:AlternateContent>
-  <c:chart>
-    <c:title>
-      <c:tx>
-        <c:rich>
-          <a:bodyPr rot="0" spcFirstLastPara="1" vertOverflow="ellipsis" vert="horz" wrap="square" anchor="ctr" anchorCtr="1"/>
-          <a:lstStyle/>
-          <a:p>
-            <a:pPr>
-              <a:defRPr sz="1862" b="0" i="0" u="none" strike="noStrike" kern="1200" spc="0" baseline="0">
-                <a:solidFill>
-                  <a:schemeClr val="tx1">
-                    <a:lumMod val="65000"/>
-                    <a:lumOff val="35000"/>
-                  </a:schemeClr>
-                </a:solidFill>
-                <a:latin typeface="+mn-lt"/>
-                <a:ea typeface="+mn-ea"/>
-                <a:cs typeface="+mn-cs"/>
-              </a:defRPr>
-            </a:pPr>
-            <a:r>
-              <a:rPr lang="en-US" b="1" dirty="0">
-                <a:solidFill>
-                  <a:schemeClr val="tx1"/>
-                </a:solidFill>
-                <a:latin typeface="Segoe UI" charset="0"/>
-                <a:ea typeface="Segoe UI" charset="0"/>
-                <a:cs typeface="Segoe UI" charset="0"/>
-              </a:rPr>
-              <a:t>CHART TITLE</a:t>
-            </a:r>
-          </a:p>
-        </c:rich>
-      </c:tx>
-      <c:overlay val="0"/>
-      <c:spPr>
-        <a:noFill/>
-        <a:ln>
-          <a:noFill/>
-        </a:ln>
-        <a:effectLst/>
-      </c:spPr>
-      <c:txPr>
-        <a:bodyPr rot="0" spcFirstLastPara="1" vertOverflow="ellipsis" vert="horz" wrap="square" anchor="ctr" anchorCtr="1"/>
-        <a:lstStyle/>
-        <a:p>
-          <a:pPr>
-            <a:defRPr sz="1862" b="0" i="0" u="none" strike="noStrike" kern="1200" spc="0" baseline="0">
-              <a:solidFill>
-                <a:schemeClr val="tx1">
-                  <a:lumMod val="65000"/>
-                  <a:lumOff val="35000"/>
-                </a:schemeClr>
-              </a:solidFill>
-              <a:latin typeface="+mn-lt"/>
-              <a:ea typeface="+mn-ea"/>
-              <a:cs typeface="+mn-cs"/>
-            </a:defRPr>
-          </a:pPr>
-          <a:endParaRPr lang="en-US"/>
-        </a:p>
-      </c:txPr>
-    </c:title>
-    <c:autoTitleDeleted val="0"/>
-    <c:plotArea>
-      <c:layout/>
-      <c:barChart>
-        <c:barDir val="col"/>
-        <c:grouping val="clustered"/>
-        <c:varyColors val="0"/>
-        <c:ser>
-          <c:idx val="0"/>
-          <c:order val="0"/>
-          <c:tx>
-            <c:strRef>
-              <c:f>Sheet1!$B$1</c:f>
-              <c:strCache>
-                <c:ptCount val="1"/>
-                <c:pt idx="0">
-                  <c:v>Series 1</c:v>
-                </c:pt>
-              </c:strCache>
-            </c:strRef>
-          </c:tx>
-          <c:spPr>
-            <a:solidFill>
-              <a:schemeClr val="tx1"/>
-            </a:solidFill>
-            <a:ln>
-              <a:noFill/>
-            </a:ln>
-            <a:effectLst/>
-          </c:spPr>
-          <c:invertIfNegative val="0"/>
-          <c:cat>
-            <c:strRef>
-              <c:f>Sheet1!$A$2:$A$6</c:f>
-              <c:strCache>
-                <c:ptCount val="5"/>
-                <c:pt idx="0">
-                  <c:v>A</c:v>
-                </c:pt>
-                <c:pt idx="1">
-                  <c:v>B</c:v>
-                </c:pt>
-                <c:pt idx="2">
-                  <c:v>C</c:v>
-                </c:pt>
-                <c:pt idx="3">
-                  <c:v>D</c:v>
-                </c:pt>
-                <c:pt idx="4">
-                  <c:v>E</c:v>
-                </c:pt>
-              </c:strCache>
-            </c:strRef>
-          </c:cat>
-          <c:val>
-            <c:numRef>
-              <c:f>Sheet1!$B$2:$B$6</c:f>
-              <c:numCache>
-                <c:formatCode>General</c:formatCode>
-                <c:ptCount val="5"/>
-                <c:pt idx="0">
-                  <c:v>2</c:v>
-                </c:pt>
-                <c:pt idx="1">
-                  <c:v>3</c:v>
-                </c:pt>
-                <c:pt idx="2">
-                  <c:v>4</c:v>
-                </c:pt>
-                <c:pt idx="3">
-                  <c:v>5</c:v>
-                </c:pt>
-                <c:pt idx="4">
-                  <c:v>6</c:v>
-                </c:pt>
-              </c:numCache>
-            </c:numRef>
-          </c:val>
-          <c:extLst>
-            <c:ext xmlns:c16="http://schemas.microsoft.com/office/drawing/2014/chart" uri="{C3380CC4-5D6E-409C-BE32-E72D297353CC}">
-              <c16:uniqueId val="{00000000-E7B7-44B1-A934-BF0690BB3F66}"/>
-            </c:ext>
-          </c:extLst>
-        </c:ser>
-        <c:dLbls>
-          <c:showLegendKey val="0"/>
-          <c:showVal val="0"/>
-          <c:showCatName val="0"/>
-          <c:showSerName val="0"/>
-          <c:showPercent val="0"/>
-          <c:showBubbleSize val="0"/>
-        </c:dLbls>
-        <c:gapWidth val="219"/>
-        <c:overlap val="-27"/>
-        <c:axId val="-104174608"/>
-        <c:axId val="-122332976"/>
-      </c:barChart>
-      <c:catAx>
-        <c:axId val="-104174608"/>
-        <c:scaling>
-          <c:orientation val="minMax"/>
-        </c:scaling>
-        <c:delete val="0"/>
-        <c:axPos val="b"/>
-        <c:numFmt formatCode="General" sourceLinked="1"/>
-        <c:majorTickMark val="none"/>
-        <c:minorTickMark val="none"/>
-        <c:tickLblPos val="nextTo"/>
-        <c:spPr>
-          <a:noFill/>
-          <a:ln w="9525" cap="flat" cmpd="sng" algn="ctr">
-            <a:solidFill>
-              <a:schemeClr val="tx1">
-                <a:lumMod val="15000"/>
-                <a:lumOff val="85000"/>
-              </a:schemeClr>
-            </a:solidFill>
-            <a:round/>
-          </a:ln>
-          <a:effectLst/>
-        </c:spPr>
-        <c:txPr>
-          <a:bodyPr rot="-60000000" spcFirstLastPara="1" vertOverflow="ellipsis" vert="horz" wrap="square" anchor="ctr" anchorCtr="1"/>
-          <a:lstStyle/>
-          <a:p>
-            <a:pPr>
-              <a:defRPr sz="1197" b="0" i="0" u="none" strike="noStrike" kern="1200" baseline="0">
-                <a:solidFill>
-                  <a:schemeClr val="tx2"/>
-                </a:solidFill>
-                <a:latin typeface="+mn-lt"/>
-                <a:ea typeface="+mn-ea"/>
-                <a:cs typeface="+mn-cs"/>
-              </a:defRPr>
-            </a:pPr>
-            <a:endParaRPr lang="en-US"/>
-          </a:p>
-        </c:txPr>
-        <c:crossAx val="-122332976"/>
-        <c:crosses val="autoZero"/>
-        <c:auto val="1"/>
-        <c:lblAlgn val="ctr"/>
-        <c:lblOffset val="100"/>
-        <c:noMultiLvlLbl val="0"/>
-      </c:catAx>
-      <c:valAx>
-        <c:axId val="-122332976"/>
-        <c:scaling>
-          <c:orientation val="minMax"/>
-        </c:scaling>
-        <c:delete val="0"/>
-        <c:axPos val="l"/>
-        <c:majorGridlines>
-          <c:spPr>
-            <a:ln w="9525" cap="flat" cmpd="sng" algn="ctr">
-              <a:solidFill>
-                <a:schemeClr val="tx1">
-                  <a:lumMod val="15000"/>
-                  <a:lumOff val="85000"/>
-                </a:schemeClr>
-              </a:solidFill>
-              <a:round/>
-            </a:ln>
-            <a:effectLst/>
-          </c:spPr>
-        </c:majorGridlines>
-        <c:numFmt formatCode="General" sourceLinked="1"/>
-        <c:majorTickMark val="none"/>
-        <c:minorTickMark val="none"/>
-        <c:tickLblPos val="nextTo"/>
-        <c:spPr>
-          <a:noFill/>
-          <a:ln>
-            <a:noFill/>
-          </a:ln>
-          <a:effectLst/>
-        </c:spPr>
-        <c:txPr>
-          <a:bodyPr rot="-60000000" spcFirstLastPara="1" vertOverflow="ellipsis" vert="horz" wrap="square" anchor="ctr" anchorCtr="1"/>
-          <a:lstStyle/>
-          <a:p>
-            <a:pPr>
-              <a:defRPr sz="1197" b="0" i="0" u="none" strike="noStrike" kern="1200" baseline="0">
-                <a:solidFill>
-                  <a:schemeClr val="tx2"/>
-                </a:solidFill>
-                <a:latin typeface="+mn-lt"/>
-                <a:ea typeface="+mn-ea"/>
-                <a:cs typeface="+mn-cs"/>
-              </a:defRPr>
-            </a:pPr>
-            <a:endParaRPr lang="en-US"/>
-          </a:p>
-        </c:txPr>
-        <c:crossAx val="-104174608"/>
-        <c:crosses val="autoZero"/>
-        <c:crossBetween val="between"/>
-      </c:valAx>
-      <c:spPr>
-        <a:noFill/>
-        <a:ln>
-          <a:noFill/>
-        </a:ln>
-        <a:effectLst/>
-      </c:spPr>
-    </c:plotArea>
-    <c:plotVisOnly val="1"/>
-    <c:dispBlanksAs val="gap"/>
-    <c:showDLblsOverMax val="0"/>
-  </c:chart>
-  <c:spPr>
-    <a:noFill/>
-    <a:ln>
-      <a:noFill/>
-    </a:ln>
-    <a:effectLst/>
-  </c:spPr>
-  <c:txPr>
-    <a:bodyPr/>
-    <a:lstStyle/>
-    <a:p>
-      <a:pPr>
-        <a:defRPr/>
-      </a:pPr>
-      <a:endParaRPr lang="en-US"/>
-    </a:p>
-  </c:txPr>
-  <c:externalData r:id="rId3">
-    <c:autoUpdate val="0"/>
-  </c:externalData>
-</c:chartSpace>
-</file>
-
-<file path=ppt/charts/colors1.xml><?xml version="1.0" encoding="utf-8"?>
-<cs:colorStyle xmlns:cs="http://schemas.microsoft.com/office/drawing/2012/chartStyle" xmlns:a="http://schemas.openxmlformats.org/drawingml/2006/main" meth="cycle" id="20">
-  <a:schemeClr val="dk1"/>
-  <cs:variation>
-    <a:tint val="88500"/>
-  </cs:variation>
-  <cs:variation>
-    <a:tint val="55000"/>
-  </cs:variation>
-  <cs:variation>
-    <a:tint val="75000"/>
-  </cs:variation>
-  <cs:variation>
-    <a:tint val="98500"/>
-  </cs:variation>
-  <cs:variation>
-    <a:tint val="30000"/>
-  </cs:variation>
-  <cs:variation>
-    <a:tint val="60000"/>
-  </cs:variation>
-  <cs:variation>
-    <a:tint val="80000"/>
-  </cs:variation>
-</cs:colorStyle>
-</file>
-
-<file path=ppt/charts/style1.xml><?xml version="1.0" encoding="utf-8"?>
-<cs:chartStyle xmlns:cs="http://schemas.microsoft.com/office/drawing/2012/chartStyle" xmlns:a="http://schemas.openxmlformats.org/drawingml/2006/main" id="201">
-  <cs:axisTitle>
-    <cs:lnRef idx="0"/>
-    <cs:fillRef idx="0"/>
-    <cs:effectRef idx="0"/>
-    <cs:fontRef idx="minor">
-      <a:schemeClr val="tx1">
-        <a:lumMod val="65000"/>
-        <a:lumOff val="35000"/>
-      </a:schemeClr>
-    </cs:fontRef>
-    <cs:defRPr sz="1330" kern="1200"/>
-  </cs:axisTitle>
-  <cs:categoryAxis>
-    <cs:lnRef idx="0"/>
-    <cs:fillRef idx="0"/>
-    <cs:effectRef idx="0"/>
-    <cs:fontRef idx="minor">
-      <a:schemeClr val="tx1">
-        <a:lumMod val="65000"/>
-        <a:lumOff val="35000"/>
-      </a:schemeClr>
-    </cs:fontRef>
-    <cs:spPr>
-      <a:ln w="9525" cap="flat" cmpd="sng" algn="ctr">
-        <a:solidFill>
-          <a:schemeClr val="tx1">
-            <a:lumMod val="15000"/>
-            <a:lumOff val="85000"/>
-          </a:schemeClr>
-        </a:solidFill>
-        <a:round/>
-      </a:ln>
-    </cs:spPr>
-    <cs:defRPr sz="1197" kern="1200"/>
-  </cs:categoryAxis>
-  <cs:chartArea mods="allowNoFillOverride allowNoLineOverride">
-    <cs:lnRef idx="0"/>
-    <cs:fillRef idx="0"/>
-    <cs:effectRef idx="0"/>
-    <cs:fontRef idx="minor">
-      <a:schemeClr val="tx1"/>
-    </cs:fontRef>
-    <cs:spPr>
-      <a:solidFill>
-        <a:schemeClr val="bg1"/>
-      </a:solidFill>
-      <a:ln w="9525" cap="flat" cmpd="sng" algn="ctr">
-        <a:solidFill>
-          <a:schemeClr val="tx1">
-            <a:lumMod val="15000"/>
-            <a:lumOff val="85000"/>
-          </a:schemeClr>
-        </a:solidFill>
-        <a:round/>
-      </a:ln>
-    </cs:spPr>
-    <cs:defRPr sz="1330" kern="1200"/>
-  </cs:chartArea>
-  <cs:dataLabel>
-    <cs:lnRef idx="0"/>
-    <cs:fillRef idx="0"/>
-    <cs:effectRef idx="0"/>
-    <cs:fontRef idx="minor">
-      <a:schemeClr val="tx1">
-        <a:lumMod val="75000"/>
-        <a:lumOff val="25000"/>
-      </a:schemeClr>
-    </cs:fontRef>
-    <cs:defRPr sz="1197" kern="1200"/>
-  </cs:dataLabel>
-  <cs:dataLabelCallout>
-    <cs:lnRef idx="0"/>
-    <cs:fillRef idx="0"/>
-    <cs:effectRef idx="0"/>
-    <cs:fontRef idx="minor">
-      <a:schemeClr val="dk1">
-        <a:lumMod val="65000"/>
-        <a:lumOff val="35000"/>
-      </a:schemeClr>
-    </cs:fontRef>
-    <cs:spPr>
-      <a:solidFill>
-        <a:schemeClr val="lt1"/>
-      </a:solidFill>
-      <a:ln>
-        <a:solidFill>
-          <a:schemeClr val="dk1">
-            <a:lumMod val="25000"/>
-            <a:lumOff val="75000"/>
-          </a:schemeClr>
-        </a:solidFill>
-      </a:ln>
-    </cs:spPr>
-    <cs:defRPr sz="1197" kern="1200"/>
-    <cs:bodyPr rot="0" spcFirstLastPara="1" vertOverflow="clip" horzOverflow="clip" vert="horz" wrap="square" lIns="36576" tIns="18288" rIns="36576" bIns="18288" anchor="ctr" anchorCtr="1">
-      <a:spAutoFit/>
-    </cs:bodyPr>
-  </cs:dataLabelCallout>
-  <cs:dataPoint>
-    <cs:lnRef idx="0"/>
-    <cs:fillRef idx="1">
-      <cs:styleClr val="auto"/>
-    </cs:fillRef>
-    <cs:effectRef idx="0"/>
-    <cs:fontRef idx="minor">
-      <a:schemeClr val="tx1"/>
-    </cs:fontRef>
-  </cs:dataPoint>
-  <cs:dataPoint3D>
-    <cs:lnRef idx="0"/>
-    <cs:fillRef idx="1">
-      <cs:styleClr val="auto"/>
-    </cs:fillRef>
-    <cs:effectRef idx="0"/>
-    <cs:fontRef idx="minor">
-      <a:schemeClr val="tx1"/>
-    </cs:fontRef>
-  </cs:dataPoint3D>
-  <cs:dataPointLine>
-    <cs:lnRef idx="0">
-      <cs:styleClr val="auto"/>
-    </cs:lnRef>
-    <cs:fillRef idx="1"/>
-    <cs:effectRef idx="0"/>
-    <cs:fontRef idx="minor">
-      <a:schemeClr val="tx1"/>
-    </cs:fontRef>
-    <cs:spPr>
-      <a:ln w="28575" cap="rnd">
-        <a:solidFill>
-          <a:schemeClr val="phClr"/>
-        </a:solidFill>
-        <a:round/>
-      </a:ln>
-    </cs:spPr>
-  </cs:dataPointLine>
-  <cs:dataPointMarker>
-    <cs:lnRef idx="0">
-      <cs:styleClr val="auto"/>
-    </cs:lnRef>
-    <cs:fillRef idx="1">
-      <cs:styleClr val="auto"/>
-    </cs:fillRef>
-    <cs:effectRef idx="0"/>
-    <cs:fontRef idx="minor">
-      <a:schemeClr val="tx1"/>
-    </cs:fontRef>
-    <cs:spPr>
-      <a:ln w="9525">
-        <a:solidFill>
-          <a:schemeClr val="phClr"/>
-        </a:solidFill>
-      </a:ln>
-    </cs:spPr>
-  </cs:dataPointMarker>
-  <cs:dataPointMarkerLayout symbol="circle" size="5"/>
-  <cs:dataPointWireframe>
-    <cs:lnRef idx="0">
-      <cs:styleClr val="auto"/>
-    </cs:lnRef>
-    <cs:fillRef idx="1"/>
-    <cs:effectRef idx="0"/>
-    <cs:fontRef idx="minor">
-      <a:schemeClr val="tx1"/>
-    </cs:fontRef>
-    <cs:spPr>
-      <a:ln w="9525" cap="rnd">
-        <a:solidFill>
-          <a:schemeClr val="phClr"/>
-        </a:solidFill>
-        <a:round/>
-      </a:ln>
-    </cs:spPr>
-  </cs:dataPointWireframe>
-  <cs:dataTable>
-    <cs:lnRef idx="0"/>
-    <cs:fillRef idx="0"/>
-    <cs:effectRef idx="0"/>
-    <cs:fontRef idx="minor">
-      <a:schemeClr val="tx1">
-        <a:lumMod val="65000"/>
-        <a:lumOff val="35000"/>
-      </a:schemeClr>
-    </cs:fontRef>
-    <cs:spPr>
-      <a:noFill/>
-      <a:ln w="9525" cap="flat" cmpd="sng" algn="ctr">
-        <a:solidFill>
-          <a:schemeClr val="tx1">
-            <a:lumMod val="15000"/>
-            <a:lumOff val="85000"/>
-          </a:schemeClr>
-        </a:solidFill>
-        <a:round/>
-      </a:ln>
-    </cs:spPr>
-    <cs:defRPr sz="1197" kern="1200"/>
-  </cs:dataTable>
-  <cs:downBar>
-    <cs:lnRef idx="0"/>
-    <cs:fillRef idx="0"/>
-    <cs:effectRef idx="0"/>
-    <cs:fontRef idx="minor">
-      <a:schemeClr val="dk1"/>
-    </cs:fontRef>
-    <cs:spPr>
-      <a:solidFill>
-        <a:schemeClr val="dk1">
-          <a:lumMod val="65000"/>
-          <a:lumOff val="35000"/>
-        </a:schemeClr>
-      </a:solidFill>
-      <a:ln w="9525">
-        <a:solidFill>
-          <a:schemeClr val="tx1">
-            <a:lumMod val="65000"/>
-            <a:lumOff val="35000"/>
-          </a:schemeClr>
-        </a:solidFill>
-      </a:ln>
-    </cs:spPr>
-  </cs:downBar>
-  <cs:dropLine>
-    <cs:lnRef idx="0"/>
-    <cs:fillRef idx="0"/>
-    <cs:effectRef idx="0"/>
-    <cs:fontRef idx="minor">
-      <a:schemeClr val="tx1"/>
-    </cs:fontRef>
-    <cs:spPr>
-      <a:ln w="9525" cap="flat" cmpd="sng" algn="ctr">
-        <a:solidFill>
-          <a:schemeClr val="tx1">
-            <a:lumMod val="35000"/>
-            <a:lumOff val="65000"/>
-          </a:schemeClr>
-        </a:solidFill>
-        <a:round/>
-      </a:ln>
-    </cs:spPr>
-  </cs:dropLine>
-  <cs:errorBar>
-    <cs:lnRef idx="0"/>
-    <cs:fillRef idx="0"/>
-    <cs:effectRef idx="0"/>
-    <cs:fontRef idx="minor">
-      <a:schemeClr val="tx1"/>
-    </cs:fontRef>
-    <cs:spPr>
-      <a:ln w="9525" cap="flat" cmpd="sng" algn="ctr">
-        <a:solidFill>
-          <a:schemeClr val="tx1">
-            <a:lumMod val="65000"/>
-            <a:lumOff val="35000"/>
-          </a:schemeClr>
-        </a:solidFill>
-        <a:round/>
-      </a:ln>
-    </cs:spPr>
-  </cs:errorBar>
-  <cs:floor>
-    <cs:lnRef idx="0"/>
-    <cs:fillRef idx="0"/>
-    <cs:effectRef idx="0"/>
-    <cs:fontRef idx="minor">
-      <a:schemeClr val="tx1"/>
-    </cs:fontRef>
-    <cs:spPr>
-      <a:noFill/>
-      <a:ln>
-        <a:noFill/>
-      </a:ln>
-    </cs:spPr>
-  </cs:floor>
-  <cs:gridlineMajor>
-    <cs:lnRef idx="0"/>
-    <cs:fillRef idx="0"/>
-    <cs:effectRef idx="0"/>
-    <cs:fontRef idx="minor">
-      <a:schemeClr val="tx1"/>
-    </cs:fontRef>
-    <cs:spPr>
-      <a:ln w="9525" cap="flat" cmpd="sng" algn="ctr">
-        <a:solidFill>
-          <a:schemeClr val="tx1">
-            <a:lumMod val="15000"/>
-            <a:lumOff val="85000"/>
-          </a:schemeClr>
-        </a:solidFill>
-        <a:round/>
-      </a:ln>
-    </cs:spPr>
-  </cs:gridlineMajor>
-  <cs:gridlineMinor>
-    <cs:lnRef idx="0"/>
-    <cs:fillRef idx="0"/>
-    <cs:effectRef idx="0"/>
-    <cs:fontRef idx="minor">
-      <a:schemeClr val="tx1"/>
-    </cs:fontRef>
-    <cs:spPr>
-      <a:ln w="9525" cap="flat" cmpd="sng" algn="ctr">
-        <a:solidFill>
-          <a:schemeClr val="tx1">
-            <a:lumMod val="5000"/>
-            <a:lumOff val="95000"/>
-          </a:schemeClr>
-        </a:solidFill>
-        <a:round/>
-      </a:ln>
-    </cs:spPr>
-  </cs:gridlineMinor>
-  <cs:hiLoLine>
-    <cs:lnRef idx="0"/>
-    <cs:fillRef idx="0"/>
-    <cs:effectRef idx="0"/>
-    <cs:fontRef idx="minor">
-      <a:schemeClr val="tx1"/>
-    </cs:fontRef>
-    <cs:spPr>
-      <a:ln w="9525" cap="flat" cmpd="sng" algn="ctr">
-        <a:solidFill>
-          <a:schemeClr val="tx1">
-            <a:lumMod val="75000"/>
-            <a:lumOff val="25000"/>
-          </a:schemeClr>
-        </a:solidFill>
-        <a:round/>
-      </a:ln>
-    </cs:spPr>
-  </cs:hiLoLine>
-  <cs:leaderLine>
-    <cs:lnRef idx="0"/>
-    <cs:fillRef idx="0"/>
-    <cs:effectRef idx="0"/>
-    <cs:fontRef idx="minor">
-      <a:schemeClr val="tx1"/>
-    </cs:fontRef>
-    <cs:spPr>
-      <a:ln w="9525" cap="flat" cmpd="sng" algn="ctr">
-        <a:solidFill>
-          <a:schemeClr val="tx1">
-            <a:lumMod val="35000"/>
-            <a:lumOff val="65000"/>
-          </a:schemeClr>
-        </a:solidFill>
-        <a:round/>
-      </a:ln>
-    </cs:spPr>
-  </cs:leaderLine>
-  <cs:legend>
-    <cs:lnRef idx="0"/>
-    <cs:fillRef idx="0"/>
-    <cs:effectRef idx="0"/>
-    <cs:fontRef idx="minor">
-      <a:schemeClr val="tx1">
-        <a:lumMod val="65000"/>
-        <a:lumOff val="35000"/>
-      </a:schemeClr>
-    </cs:fontRef>
-    <cs:defRPr sz="1197" kern="1200"/>
-  </cs:legend>
-  <cs:plotArea mods="allowNoFillOverride allowNoLineOverride">
-    <cs:lnRef idx="0"/>
-    <cs:fillRef idx="0"/>
-    <cs:effectRef idx="0"/>
-    <cs:fontRef idx="minor">
-      <a:schemeClr val="tx1"/>
-    </cs:fontRef>
-  </cs:plotArea>
-  <cs:plotArea3D mods="allowNoFillOverride allowNoLineOverride">
-    <cs:lnRef idx="0"/>
-    <cs:fillRef idx="0"/>
-    <cs:effectRef idx="0"/>
-    <cs:fontRef idx="minor">
-      <a:schemeClr val="tx1"/>
-    </cs:fontRef>
-  </cs:plotArea3D>
-  <cs:seriesAxis>
-    <cs:lnRef idx="0"/>
-    <cs:fillRef idx="0"/>
-    <cs:effectRef idx="0"/>
-    <cs:fontRef idx="minor">
-      <a:schemeClr val="tx1">
-        <a:lumMod val="65000"/>
-        <a:lumOff val="35000"/>
-      </a:schemeClr>
-    </cs:fontRef>
-    <cs:defRPr sz="1197" kern="1200"/>
-  </cs:seriesAxis>
-  <cs:seriesLine>
-    <cs:lnRef idx="0"/>
-    <cs:fillRef idx="0"/>
-    <cs:effectRef idx="0"/>
-    <cs:fontRef idx="minor">
-      <a:schemeClr val="tx1"/>
-    </cs:fontRef>
-    <cs:spPr>
-      <a:ln w="9525" cap="flat" cmpd="sng" algn="ctr">
-        <a:solidFill>
-          <a:schemeClr val="tx1">
-            <a:lumMod val="35000"/>
-            <a:lumOff val="65000"/>
-          </a:schemeClr>
-        </a:solidFill>
-        <a:round/>
-      </a:ln>
-    </cs:spPr>
-  </cs:seriesLine>
-  <cs:title>
-    <cs:lnRef idx="0"/>
-    <cs:fillRef idx="0"/>
-    <cs:effectRef idx="0"/>
-    <cs:fontRef idx="minor">
-      <a:schemeClr val="tx1">
-        <a:lumMod val="65000"/>
-        <a:lumOff val="35000"/>
-      </a:schemeClr>
-    </cs:fontRef>
-    <cs:defRPr sz="1862" b="0" kern="1200" spc="0" baseline="0"/>
-  </cs:title>
-  <cs:trendline>
-    <cs:lnRef idx="0">
-      <cs:styleClr val="auto"/>
-    </cs:lnRef>
-    <cs:fillRef idx="0"/>
-    <cs:effectRef idx="0"/>
-    <cs:fontRef idx="minor">
-      <a:schemeClr val="tx1"/>
-    </cs:fontRef>
-    <cs:spPr>
-      <a:ln w="19050" cap="rnd">
-        <a:solidFill>
-          <a:schemeClr val="phClr"/>
-        </a:solidFill>
-        <a:prstDash val="sysDot"/>
-      </a:ln>
-    </cs:spPr>
-  </cs:trendline>
-  <cs:trendlineLabel>
-    <cs:lnRef idx="0"/>
-    <cs:fillRef idx="0"/>
-    <cs:effectRef idx="0"/>
-    <cs:fontRef idx="minor">
-      <a:schemeClr val="tx1">
-        <a:lumMod val="65000"/>
-        <a:lumOff val="35000"/>
-      </a:schemeClr>
-    </cs:fontRef>
-    <cs:defRPr sz="1197" kern="1200"/>
-  </cs:trendlineLabel>
-  <cs:upBar>
-    <cs:lnRef idx="0"/>
-    <cs:fillRef idx="0"/>
-    <cs:effectRef idx="0"/>
-    <cs:fontRef idx="minor">
-      <a:schemeClr val="dk1"/>
-    </cs:fontRef>
-    <cs:spPr>
-      <a:solidFill>
-        <a:schemeClr val="lt1"/>
-      </a:solidFill>
-      <a:ln w="9525">
-        <a:solidFill>
-          <a:schemeClr val="tx1">
-            <a:lumMod val="15000"/>
-            <a:lumOff val="85000"/>
-          </a:schemeClr>
-        </a:solidFill>
-      </a:ln>
-    </cs:spPr>
-  </cs:upBar>
-  <cs:valueAxis>
-    <cs:lnRef idx="0"/>
-    <cs:fillRef idx="0"/>
-    <cs:effectRef idx="0"/>
-    <cs:fontRef idx="minor">
-      <a:schemeClr val="tx1">
-        <a:lumMod val="65000"/>
-        <a:lumOff val="35000"/>
-      </a:schemeClr>
-    </cs:fontRef>
-    <cs:defRPr sz="1197" kern="1200"/>
-  </cs:valueAxis>
-  <cs:wall>
-    <cs:lnRef idx="0"/>
-    <cs:fillRef idx="0"/>
-    <cs:effectRef idx="0"/>
-    <cs:fontRef idx="minor">
-      <a:schemeClr val="tx1"/>
-    </cs:fontRef>
-    <cs:spPr>
-      <a:noFill/>
-      <a:ln>
-        <a:noFill/>
-      </a:ln>
-    </cs:spPr>
-  </cs:wall>
-</cs:chartStyle>
 </file>
 
 <file path=ppt/diagrams/colors1.xml><?xml version="1.0" encoding="utf-8"?>
@@ -2446,15 +1606,15 @@
     </dgm:pt>
   </dgm:ptLst>
   <dgm:cxnLst>
+    <dgm:cxn modelId="{89BD0603-A8BF-42BD-91DC-FA0ED4C768A8}" srcId="{9CD1BA45-5CDF-4ECF-9F97-C603AFF4FA7E}" destId="{CFAA43BC-8480-4FA5-8823-2B68AF92BE0A}" srcOrd="0" destOrd="0" parTransId="{DC8A51E0-62D6-4CAE-A8FF-18F63A7E17A9}" sibTransId="{189831F2-835B-48FB-B40F-EA9A74DDCAE3}"/>
     <dgm:cxn modelId="{FB67AC14-6351-4C42-B819-07A92287EF81}" type="presOf" srcId="{DF96330E-DF63-477F-BF6E-CEF4812D3609}" destId="{C9D92DFB-B7E0-411E-87BF-45E399E02961}" srcOrd="0" destOrd="0" presId="urn:microsoft.com/office/officeart/2005/8/layout/vList2"/>
-    <dgm:cxn modelId="{89BD0603-A8BF-42BD-91DC-FA0ED4C768A8}" srcId="{9CD1BA45-5CDF-4ECF-9F97-C603AFF4FA7E}" destId="{CFAA43BC-8480-4FA5-8823-2B68AF92BE0A}" srcOrd="0" destOrd="0" parTransId="{DC8A51E0-62D6-4CAE-A8FF-18F63A7E17A9}" sibTransId="{189831F2-835B-48FB-B40F-EA9A74DDCAE3}"/>
+    <dgm:cxn modelId="{99182C3F-200E-4180-9B34-C9D93CD0576F}" type="presOf" srcId="{CFAA43BC-8480-4FA5-8823-2B68AF92BE0A}" destId="{92DCC94B-3F3C-474B-90AF-D777A1105F57}" srcOrd="0" destOrd="0" presId="urn:microsoft.com/office/officeart/2005/8/layout/vList2"/>
     <dgm:cxn modelId="{3686D764-9835-4399-80DC-420DFFF11A07}" srcId="{9CD1BA45-5CDF-4ECF-9F97-C603AFF4FA7E}" destId="{52D3416D-8D3E-46F2-AD32-9B1D8491E31D}" srcOrd="2" destOrd="0" parTransId="{0FEE0ADD-00CE-4E40-864D-CAD4E9334263}" sibTransId="{E078BC4C-556E-425A-94F4-E62F5366F2AD}"/>
+    <dgm:cxn modelId="{E26FA853-CE37-44E2-A95B-F1607AB1AA7C}" srcId="{9CD1BA45-5CDF-4ECF-9F97-C603AFF4FA7E}" destId="{DF96330E-DF63-477F-BF6E-CEF4812D3609}" srcOrd="1" destOrd="0" parTransId="{8663C956-0F00-48C5-BBF9-8E21547A45B1}" sibTransId="{C01F83FF-5C40-4CCC-89EE-AA81A231AD7C}"/>
+    <dgm:cxn modelId="{109DE47E-3A77-4869-98FD-E6D6C9631004}" type="presOf" srcId="{52D3416D-8D3E-46F2-AD32-9B1D8491E31D}" destId="{314A1652-E2DE-4BC2-8F9D-FD76FC108826}" srcOrd="0" destOrd="0" presId="urn:microsoft.com/office/officeart/2005/8/layout/vList2"/>
+    <dgm:cxn modelId="{7DC82F90-5028-44CC-9507-32D39D1656C2}" type="presOf" srcId="{9CD1BA45-5CDF-4ECF-9F97-C603AFF4FA7E}" destId="{2666DAA4-A82B-4FC6-9CBB-E5366038A749}" srcOrd="0" destOrd="0" presId="urn:microsoft.com/office/officeart/2005/8/layout/vList2"/>
+    <dgm:cxn modelId="{40EE3DCD-DCEF-4325-B137-2F6403B23060}" type="presOf" srcId="{E0748DB7-8F35-413E-BA9B-7A1C1AF7B56A}" destId="{BF949400-2E85-4920-A685-1C44A0D30C9A}" srcOrd="0" destOrd="0" presId="urn:microsoft.com/office/officeart/2005/8/layout/vList2"/>
     <dgm:cxn modelId="{CA73E1D2-6798-426C-BF1D-3F4E60FD391C}" srcId="{9CD1BA45-5CDF-4ECF-9F97-C603AFF4FA7E}" destId="{E0748DB7-8F35-413E-BA9B-7A1C1AF7B56A}" srcOrd="3" destOrd="0" parTransId="{C96EF543-34B1-40AD-AED6-F167016476C1}" sibTransId="{DF18792D-E602-44FD-8FE7-A221810015E5}"/>
-    <dgm:cxn modelId="{E26FA853-CE37-44E2-A95B-F1607AB1AA7C}" srcId="{9CD1BA45-5CDF-4ECF-9F97-C603AFF4FA7E}" destId="{DF96330E-DF63-477F-BF6E-CEF4812D3609}" srcOrd="1" destOrd="0" parTransId="{8663C956-0F00-48C5-BBF9-8E21547A45B1}" sibTransId="{C01F83FF-5C40-4CCC-89EE-AA81A231AD7C}"/>
-    <dgm:cxn modelId="{7DC82F90-5028-44CC-9507-32D39D1656C2}" type="presOf" srcId="{9CD1BA45-5CDF-4ECF-9F97-C603AFF4FA7E}" destId="{2666DAA4-A82B-4FC6-9CBB-E5366038A749}" srcOrd="0" destOrd="0" presId="urn:microsoft.com/office/officeart/2005/8/layout/vList2"/>
-    <dgm:cxn modelId="{109DE47E-3A77-4869-98FD-E6D6C9631004}" type="presOf" srcId="{52D3416D-8D3E-46F2-AD32-9B1D8491E31D}" destId="{314A1652-E2DE-4BC2-8F9D-FD76FC108826}" srcOrd="0" destOrd="0" presId="urn:microsoft.com/office/officeart/2005/8/layout/vList2"/>
-    <dgm:cxn modelId="{99182C3F-200E-4180-9B34-C9D93CD0576F}" type="presOf" srcId="{CFAA43BC-8480-4FA5-8823-2B68AF92BE0A}" destId="{92DCC94B-3F3C-474B-90AF-D777A1105F57}" srcOrd="0" destOrd="0" presId="urn:microsoft.com/office/officeart/2005/8/layout/vList2"/>
-    <dgm:cxn modelId="{40EE3DCD-DCEF-4325-B137-2F6403B23060}" type="presOf" srcId="{E0748DB7-8F35-413E-BA9B-7A1C1AF7B56A}" destId="{BF949400-2E85-4920-A685-1C44A0D30C9A}" srcOrd="0" destOrd="0" presId="urn:microsoft.com/office/officeart/2005/8/layout/vList2"/>
     <dgm:cxn modelId="{08B1E724-0E4D-48E5-B43B-6FE462367137}" type="presParOf" srcId="{2666DAA4-A82B-4FC6-9CBB-E5366038A749}" destId="{92DCC94B-3F3C-474B-90AF-D777A1105F57}" srcOrd="0" destOrd="0" presId="urn:microsoft.com/office/officeart/2005/8/layout/vList2"/>
     <dgm:cxn modelId="{39F6F3CE-0D44-4D4D-9C19-C92C924F878C}" type="presParOf" srcId="{2666DAA4-A82B-4FC6-9CBB-E5366038A749}" destId="{B8DA694C-3B24-48FF-AF67-F68F07137F32}" srcOrd="1" destOrd="0" presId="urn:microsoft.com/office/officeart/2005/8/layout/vList2"/>
     <dgm:cxn modelId="{A7606084-0E9F-4EF6-ACA0-ADDDECF8A02A}" type="presParOf" srcId="{2666DAA4-A82B-4FC6-9CBB-E5366038A749}" destId="{C9D92DFB-B7E0-411E-87BF-45E399E02961}" srcOrd="2" destOrd="0" presId="urn:microsoft.com/office/officeart/2005/8/layout/vList2"/>
@@ -4484,73 +3644,7 @@
     </p:spTree>
     <p:extLst>
       <p:ext uri="{BB962C8B-B14F-4D97-AF65-F5344CB8AC3E}">
-        <p14:creationId xmlns:p14="http://schemas.microsoft.com/office/powerpoint/2010/main" val="3749207922"/>
-      </p:ext>
-    </p:extLst>
-  </p:cSld>
-  <p:clrMapOvr>
-    <a:masterClrMapping/>
-  </p:clrMapOvr>
-</p:notes>
-</file>
-
-<file path=ppt/notesSlides/notesSlide11.xml><?xml version="1.0" encoding="utf-8"?>
-<p:notes xmlns:a="http://schemas.openxmlformats.org/drawingml/2006/main" xmlns:r="http://schemas.openxmlformats.org/officeDocument/2006/relationships" xmlns:p="http://schemas.openxmlformats.org/presentationml/2006/main">
-  <p:cSld>
-    <p:spTree>
-      <p:nvGrpSpPr>
-        <p:cNvPr id="1" name=""/>
-        <p:cNvGrpSpPr/>
-        <p:nvPr/>
-      </p:nvGrpSpPr>
-      <p:grpSpPr>
-        <a:xfrm>
-          <a:off x="0" y="0"/>
-          <a:ext cx="0" cy="0"/>
-          <a:chOff x="0" y="0"/>
-          <a:chExt cx="0" cy="0"/>
-        </a:xfrm>
-      </p:grpSpPr>
-      <p:sp>
-        <p:nvSpPr>
-          <p:cNvPr id="2" name="Slide Image Placeholder 1"/>
-          <p:cNvSpPr>
-            <a:spLocks noGrp="1" noRot="1" noChangeAspect="1"/>
-          </p:cNvSpPr>
-          <p:nvPr>
-            <p:ph type="sldImg"/>
-          </p:nvPr>
-        </p:nvSpPr>
-        <p:spPr>
-          <a:xfrm>
-            <a:off x="479425" y="685800"/>
-            <a:ext cx="5899150" cy="3429000"/>
-          </a:xfrm>
-        </p:spPr>
-      </p:sp>
-      <p:sp>
-        <p:nvSpPr>
-          <p:cNvPr id="3" name="Notes Placeholder 2"/>
-          <p:cNvSpPr>
-            <a:spLocks noGrp="1"/>
-          </p:cNvSpPr>
-          <p:nvPr>
-            <p:ph type="body" idx="1"/>
-          </p:nvPr>
-        </p:nvSpPr>
-        <p:spPr/>
-        <p:txBody>
-          <a:bodyPr/>
-          <a:lstStyle/>
-          <a:p>
-            <a:endParaRPr lang="en-US" dirty="0"/>
-          </a:p>
-        </p:txBody>
-      </p:sp>
-    </p:spTree>
-    <p:extLst>
-      <p:ext uri="{BB962C8B-B14F-4D97-AF65-F5344CB8AC3E}">
-        <p14:creationId xmlns:p14="http://schemas.microsoft.com/office/powerpoint/2010/main" val="788445248"/>
+        <p14:creationId xmlns:p14="http://schemas.microsoft.com/office/powerpoint/2010/main" val="732458306"/>
       </p:ext>
     </p:extLst>
   </p:cSld>
@@ -5012,7 +4106,7 @@
     </p:spTree>
     <p:extLst>
       <p:ext uri="{BB962C8B-B14F-4D97-AF65-F5344CB8AC3E}">
-        <p14:creationId xmlns:p14="http://schemas.microsoft.com/office/powerpoint/2010/main" val="107540346"/>
+        <p14:creationId xmlns:p14="http://schemas.microsoft.com/office/powerpoint/2010/main" val="3749207922"/>
       </p:ext>
     </p:extLst>
   </p:cSld>
@@ -5071,14 +4165,14 @@
           <a:bodyPr/>
           <a:lstStyle/>
           <a:p>
-            <a:endParaRPr lang="en-US"/>
+            <a:endParaRPr lang="en-US" dirty="0"/>
           </a:p>
         </p:txBody>
       </p:sp>
     </p:spTree>
     <p:extLst>
       <p:ext uri="{BB962C8B-B14F-4D97-AF65-F5344CB8AC3E}">
-        <p14:creationId xmlns:p14="http://schemas.microsoft.com/office/powerpoint/2010/main" val="615808179"/>
+        <p14:creationId xmlns:p14="http://schemas.microsoft.com/office/powerpoint/2010/main" val="107540346"/>
       </p:ext>
     </p:extLst>
   </p:cSld>
@@ -19826,6 +18920,15 @@
               <a:t>Friday, August 3, 2018</a:t>
             </a:r>
           </a:p>
+          <a:p>
+            <a:endParaRPr lang="en-US" dirty="0"/>
+          </a:p>
+          <a:p>
+            <a:r>
+              <a:rPr lang="en-US" dirty="0"/>
+              <a:t>By: Priyakant Patel</a:t>
+            </a:r>
+          </a:p>
         </p:txBody>
       </p:sp>
       <p:sp>
@@ -19847,7 +18950,6 @@
               <a:rPr lang="en-US" dirty="0"/>
               <a:t>Docker for Windows</a:t>
             </a:r>
-            <a:endParaRPr lang="en-US" dirty="0"/>
           </a:p>
         </p:txBody>
       </p:sp>
@@ -20033,210 +19135,7 @@
     </p:spTree>
     <p:extLst>
       <p:ext uri="{BB962C8B-B14F-4D97-AF65-F5344CB8AC3E}">
-        <p14:creationId xmlns:p14="http://schemas.microsoft.com/office/powerpoint/2010/main" val="2608978483"/>
-      </p:ext>
-    </p:extLst>
-  </p:cSld>
-  <p:clrMapOvr>
-    <a:masterClrMapping/>
-  </p:clrMapOvr>
-</p:sld>
-</file>
-
-<file path=ppt/slides/slide11.xml><?xml version="1.0" encoding="utf-8"?>
-<p:sld xmlns:a="http://schemas.openxmlformats.org/drawingml/2006/main" xmlns:r="http://schemas.openxmlformats.org/officeDocument/2006/relationships" xmlns:p="http://schemas.openxmlformats.org/presentationml/2006/main">
-  <p:cSld>
-    <p:spTree>
-      <p:nvGrpSpPr>
-        <p:cNvPr id="1" name=""/>
-        <p:cNvGrpSpPr/>
-        <p:nvPr/>
-      </p:nvGrpSpPr>
-      <p:grpSpPr>
-        <a:xfrm>
-          <a:off x="0" y="0"/>
-          <a:ext cx="0" cy="0"/>
-          <a:chOff x="0" y="0"/>
-          <a:chExt cx="0" cy="0"/>
-        </a:xfrm>
-      </p:grpSpPr>
-      <p:graphicFrame>
-        <p:nvGraphicFramePr>
-          <p:cNvPr id="8" name="Content Placeholder 7"/>
-          <p:cNvGraphicFramePr>
-            <a:graphicFrameLocks noGrp="1"/>
-          </p:cNvGraphicFramePr>
-          <p:nvPr>
-            <p:ph sz="half" idx="1"/>
-            <p:extLst>
-              <p:ext uri="{D42A27DB-BD31-4B8C-83A1-F6EECF244321}">
-                <p14:modId xmlns:p14="http://schemas.microsoft.com/office/powerpoint/2010/main" val="700863859"/>
-              </p:ext>
-            </p:extLst>
-          </p:nvPr>
-        </p:nvGraphicFramePr>
-        <p:xfrm>
-          <a:off x="837982" y="2114485"/>
-          <a:ext cx="5180013" cy="4495800"/>
-        </p:xfrm>
-        <a:graphic>
-          <a:graphicData uri="http://schemas.openxmlformats.org/drawingml/2006/chart">
-            <c:chart xmlns:c="http://schemas.openxmlformats.org/drawingml/2006/chart" xmlns:r="http://schemas.openxmlformats.org/officeDocument/2006/relationships" r:id="rId3"/>
-          </a:graphicData>
-        </a:graphic>
-      </p:graphicFrame>
-      <p:sp>
-        <p:nvSpPr>
-          <p:cNvPr id="4" name="Content Placeholder 3"/>
-          <p:cNvSpPr>
-            <a:spLocks noGrp="1"/>
-          </p:cNvSpPr>
-          <p:nvPr>
-            <p:ph sz="half" idx="2"/>
-          </p:nvPr>
-        </p:nvSpPr>
-        <p:spPr>
-          <a:xfrm>
-            <a:off x="6170593" y="2717605"/>
-            <a:ext cx="5180251" cy="4496383"/>
-          </a:xfrm>
-        </p:spPr>
-        <p:txBody>
-          <a:bodyPr/>
-          <a:lstStyle/>
-          <a:p>
-            <a:r>
-              <a:rPr lang="en-US" dirty="0"/>
-              <a:t>This is example bullet point for your presentation. </a:t>
-            </a:r>
-          </a:p>
-          <a:p>
-            <a:r>
-              <a:rPr lang="en-US" dirty="0"/>
-              <a:t>This is example bullet point for your presentation. </a:t>
-            </a:r>
-          </a:p>
-          <a:p>
-            <a:r>
-              <a:rPr lang="en-US" dirty="0"/>
-              <a:t>This is example bullet point for your presentation. </a:t>
-            </a:r>
-          </a:p>
-        </p:txBody>
-      </p:sp>
-      <p:sp>
-        <p:nvSpPr>
-          <p:cNvPr id="2" name="Title 1"/>
-          <p:cNvSpPr>
-            <a:spLocks noGrp="1"/>
-          </p:cNvSpPr>
-          <p:nvPr>
-            <p:ph type="title"/>
-          </p:nvPr>
-        </p:nvSpPr>
-        <p:spPr/>
-        <p:txBody>
-          <a:bodyPr>
-            <a:normAutofit fontScale="90000"/>
-          </a:bodyPr>
-          <a:lstStyle/>
-          <a:p>
-            <a:r>
-              <a:rPr lang="en-US" dirty="0"/>
-              <a:t>This is an example of a graph</a:t>
-            </a:r>
-          </a:p>
-        </p:txBody>
-      </p:sp>
-      <p:sp>
-        <p:nvSpPr>
-          <p:cNvPr id="7" name="TextBox 6"/>
-          <p:cNvSpPr txBox="1"/>
-          <p:nvPr/>
-        </p:nvSpPr>
-        <p:spPr>
-          <a:xfrm>
-            <a:off x="571351" y="542785"/>
-            <a:ext cx="4255173" cy="215444"/>
-          </a:xfrm>
-          <a:prstGeom prst="rect">
-            <a:avLst/>
-          </a:prstGeom>
-          <a:noFill/>
-        </p:spPr>
-        <p:txBody>
-          <a:bodyPr wrap="square" rtlCol="0">
-            <a:spAutoFit/>
-          </a:bodyPr>
-          <a:lstStyle/>
-          <a:p>
-            <a:r>
-              <a:rPr lang="en-US" sz="1000" b="0" dirty="0">
-                <a:solidFill>
-                  <a:srgbClr val="01B4D2"/>
-                </a:solidFill>
-                <a:latin typeface="Brandon Grotesque Bold" charset="0"/>
-              </a:rPr>
-              <a:t>Docker for Windows</a:t>
-            </a:r>
-          </a:p>
-        </p:txBody>
-      </p:sp>
-      <p:sp>
-        <p:nvSpPr>
-          <p:cNvPr id="11" name="Rounded Rectangle 10"/>
-          <p:cNvSpPr/>
-          <p:nvPr/>
-        </p:nvSpPr>
-        <p:spPr>
-          <a:xfrm>
-            <a:off x="5082699" y="2967876"/>
-            <a:ext cx="596620" cy="3366936"/>
-          </a:xfrm>
-          <a:prstGeom prst="roundRect">
-            <a:avLst/>
-          </a:prstGeom>
-          <a:noFill/>
-          <a:ln w="19050">
-            <a:solidFill>
-              <a:srgbClr val="4DB2E3"/>
-            </a:solidFill>
-            <a:prstDash val="sysDot"/>
-          </a:ln>
-          <a:effectLst/>
-        </p:spPr>
-        <p:style>
-          <a:lnRef idx="1">
-            <a:schemeClr val="accent1"/>
-          </a:lnRef>
-          <a:fillRef idx="3">
-            <a:schemeClr val="accent1"/>
-          </a:fillRef>
-          <a:effectRef idx="2">
-            <a:schemeClr val="accent1"/>
-          </a:effectRef>
-          <a:fontRef idx="minor">
-            <a:schemeClr val="lt1"/>
-          </a:fontRef>
-        </p:style>
-        <p:txBody>
-          <a:bodyPr rtlCol="0" anchor="ctr"/>
-          <a:lstStyle/>
-          <a:p>
-            <a:pPr algn="ctr"/>
-            <a:endParaRPr lang="en-US" sz="1500" b="1" dirty="0">
-              <a:solidFill>
-                <a:schemeClr val="tx1"/>
-              </a:solidFill>
-              <a:latin typeface="Gill Sans MT" pitchFamily="34" charset="0"/>
-            </a:endParaRPr>
-          </a:p>
-        </p:txBody>
-      </p:sp>
-    </p:spTree>
-    <p:extLst>
-      <p:ext uri="{BB962C8B-B14F-4D97-AF65-F5344CB8AC3E}">
-        <p14:creationId xmlns:p14="http://schemas.microsoft.com/office/powerpoint/2010/main" val="1178498847"/>
+        <p14:creationId xmlns:p14="http://schemas.microsoft.com/office/powerpoint/2010/main" val="3834473406"/>
       </p:ext>
     </p:extLst>
   </p:cSld>
@@ -20303,13 +19202,8 @@
           <a:p>
             <a:r>
               <a:rPr lang="en-US" dirty="0"/>
-              <a:t>Connectivity &amp; </a:t>
-            </a:r>
-            <a:r>
-              <a:rPr lang="en-US" dirty="0"/>
-              <a:t>Authentication</a:t>
-            </a:r>
-            <a:endParaRPr lang="en-US" dirty="0"/>
+              <a:t>Connectivity &amp; Authentication</a:t>
+            </a:r>
           </a:p>
           <a:p>
             <a:r>
@@ -20379,12 +19273,6 @@
               </a:rPr>
               <a:t>Docker for Windows</a:t>
             </a:r>
-            <a:endParaRPr lang="en-US" sz="1000" b="0" dirty="0">
-              <a:solidFill>
-                <a:srgbClr val="01B4D2"/>
-              </a:solidFill>
-              <a:latin typeface="Brandon Grotesque Bold" charset="0"/>
-            </a:endParaRPr>
           </a:p>
         </p:txBody>
       </p:sp>
@@ -20485,7 +19373,6 @@
               <a:rPr lang="en-US" dirty="0"/>
               <a:t>Ex: ASP.NET, WCF, Windows service, etc.</a:t>
             </a:r>
-            <a:endParaRPr lang="en-US" dirty="0"/>
           </a:p>
         </p:txBody>
       </p:sp>
@@ -20549,12 +19436,6 @@
               </a:rPr>
               <a:t>Docker for Windows</a:t>
             </a:r>
-            <a:endParaRPr lang="en-US" sz="1000" b="0" dirty="0">
-              <a:solidFill>
-                <a:srgbClr val="01B4D2"/>
-              </a:solidFill>
-              <a:latin typeface="Brandon Grotesque Bold" charset="0"/>
-            </a:endParaRPr>
           </a:p>
         </p:txBody>
       </p:sp>
@@ -20999,7 +19880,6 @@
               <a:rPr lang="en-US" dirty="0"/>
               <a:t>Container process</a:t>
             </a:r>
-            <a:endParaRPr lang="en-US" dirty="0"/>
           </a:p>
         </p:txBody>
       </p:sp>
@@ -21206,22 +20086,108 @@
       </p:grpSpPr>
       <p:sp>
         <p:nvSpPr>
-          <p:cNvPr id="4" name="Title 3"/>
+          <p:cNvPr id="4" name="Content Placeholder 3"/>
           <p:cNvSpPr>
             <a:spLocks noGrp="1"/>
           </p:cNvSpPr>
           <p:nvPr>
-            <p:ph type="ctrTitle"/>
+            <p:ph sz="half" idx="2"/>
           </p:nvPr>
         </p:nvSpPr>
-        <p:spPr/>
+        <p:spPr>
+          <a:xfrm>
+            <a:off x="571351" y="2021837"/>
+            <a:ext cx="10779493" cy="4496383"/>
+          </a:xfrm>
+        </p:spPr>
         <p:txBody>
           <a:bodyPr/>
           <a:lstStyle/>
           <a:p>
             <a:r>
               <a:rPr lang="en-US" dirty="0"/>
-              <a:t>Upgrade Features</a:t>
+              <a:t>Create security group to hold machines.</a:t>
+            </a:r>
+          </a:p>
+          <a:p>
+            <a:r>
+              <a:rPr lang="en-US" dirty="0"/>
+              <a:t>Crate service account which can retrieve passwords on machine specified (security group).</a:t>
+            </a:r>
+          </a:p>
+          <a:p>
+            <a:r>
+              <a:rPr lang="en-US" dirty="0"/>
+              <a:t>Run container using service account</a:t>
+            </a:r>
+          </a:p>
+          <a:p>
+            <a:pPr marL="0" indent="0">
+              <a:buNone/>
+            </a:pPr>
+            <a:endParaRPr lang="en-US" dirty="0"/>
+          </a:p>
+        </p:txBody>
+      </p:sp>
+      <p:sp>
+        <p:nvSpPr>
+          <p:cNvPr id="2" name="Title 1"/>
+          <p:cNvSpPr>
+            <a:spLocks noGrp="1"/>
+          </p:cNvSpPr>
+          <p:nvPr>
+            <p:ph type="title"/>
+          </p:nvPr>
+        </p:nvSpPr>
+        <p:spPr>
+          <a:xfrm>
+            <a:off x="837982" y="1232451"/>
+            <a:ext cx="10512862" cy="514593"/>
+          </a:xfrm>
+        </p:spPr>
+        <p:txBody>
+          <a:bodyPr>
+            <a:normAutofit fontScale="90000"/>
+          </a:bodyPr>
+          <a:lstStyle/>
+          <a:p>
+            <a:r>
+              <a:rPr lang="en-US" dirty="0"/>
+              <a:t>Service Accounts</a:t>
+            </a:r>
+          </a:p>
+        </p:txBody>
+      </p:sp>
+      <p:sp>
+        <p:nvSpPr>
+          <p:cNvPr id="7" name="TextBox 6"/>
+          <p:cNvSpPr txBox="1"/>
+          <p:nvPr/>
+        </p:nvSpPr>
+        <p:spPr>
+          <a:xfrm>
+            <a:off x="571351" y="542785"/>
+            <a:ext cx="4396575" cy="215444"/>
+          </a:xfrm>
+          <a:prstGeom prst="rect">
+            <a:avLst/>
+          </a:prstGeom>
+          <a:noFill/>
+        </p:spPr>
+        <p:txBody>
+          <a:bodyPr wrap="square" rtlCol="0">
+            <a:spAutoFit/>
+          </a:bodyPr>
+          <a:lstStyle/>
+          <a:p>
+            <a:r>
+              <a:rPr lang="en-US" sz="1000" b="0" dirty="0">
+                <a:solidFill>
+                  <a:srgbClr val="01B4D2"/>
+                </a:solidFill>
+                <a:latin typeface="Brandon Grotesque Bold" charset="0"/>
+              </a:rPr>
+              <a:t>Docker for Windows</a:t>
             </a:r>
           </a:p>
         </p:txBody>
@@ -21229,7 +20195,7 @@
     </p:spTree>
     <p:extLst>
       <p:ext uri="{BB962C8B-B14F-4D97-AF65-F5344CB8AC3E}">
-        <p14:creationId xmlns:p14="http://schemas.microsoft.com/office/powerpoint/2010/main" val="841428424"/>
+        <p14:creationId xmlns:p14="http://schemas.microsoft.com/office/powerpoint/2010/main" val="2608978483"/>
       </p:ext>
     </p:extLst>
   </p:cSld>
@@ -21256,44 +20222,14 @@
           <a:chExt cx="0" cy="0"/>
         </a:xfrm>
       </p:grpSpPr>
-      <p:pic>
-        <p:nvPicPr>
-          <p:cNvPr id="2" name="Picture 1"/>
-          <p:cNvPicPr>
-            <a:picLocks noChangeAspect="1"/>
-          </p:cNvPicPr>
-          <p:nvPr/>
-        </p:nvPicPr>
-        <p:blipFill>
-          <a:blip r:embed="rId3">
-            <a:extLst>
-              <a:ext uri="{28A0092B-C50C-407E-A947-70E740481C1C}">
-                <a14:useLocalDpi xmlns:a14="http://schemas.microsoft.com/office/drawing/2010/main" val="0"/>
-              </a:ext>
-            </a:extLst>
-          </a:blip>
-          <a:stretch>
-            <a:fillRect/>
-          </a:stretch>
-        </p:blipFill>
-        <p:spPr>
-          <a:xfrm>
-            <a:off x="7994272" y="2125980"/>
-            <a:ext cx="3328074" cy="2621275"/>
-          </a:xfrm>
-          <a:prstGeom prst="rect">
-            <a:avLst/>
-          </a:prstGeom>
-        </p:spPr>
-      </p:pic>
       <p:sp>
         <p:nvSpPr>
-          <p:cNvPr id="5" name="Content Placeholder 4"/>
+          <p:cNvPr id="4" name="Title 3"/>
           <p:cNvSpPr>
             <a:spLocks noGrp="1"/>
           </p:cNvSpPr>
           <p:nvPr>
-            <p:ph type="body" sz="half" idx="2"/>
+            <p:ph type="ctrTitle"/>
           </p:nvPr>
         </p:nvSpPr>
         <p:spPr/>
@@ -21303,71 +20239,7 @@
           <a:p>
             <a:r>
               <a:rPr lang="en-US" dirty="0"/>
-              <a:t>This is example copy for your presentation. This is example copy for your presentation. This is example copy for your presentation. This is example copy for your presentation.</a:t>
-            </a:r>
-          </a:p>
-          <a:p>
-            <a:endParaRPr lang="en-US" dirty="0"/>
-          </a:p>
-          <a:p>
-            <a:endParaRPr lang="en-US" dirty="0"/>
-          </a:p>
-        </p:txBody>
-      </p:sp>
-      <p:sp>
-        <p:nvSpPr>
-          <p:cNvPr id="13" name="Title 12"/>
-          <p:cNvSpPr>
-            <a:spLocks noGrp="1"/>
-          </p:cNvSpPr>
-          <p:nvPr>
-            <p:ph type="title"/>
-          </p:nvPr>
-        </p:nvSpPr>
-        <p:spPr/>
-        <p:txBody>
-          <a:bodyPr>
-            <a:normAutofit fontScale="90000"/>
-          </a:bodyPr>
-          <a:lstStyle/>
-          <a:p>
-            <a:r>
-              <a:rPr lang="en-US" dirty="0"/>
-              <a:t>Slide headline.</a:t>
-            </a:r>
-          </a:p>
-        </p:txBody>
-      </p:sp>
-      <p:sp>
-        <p:nvSpPr>
-          <p:cNvPr id="8" name="TextBox 7"/>
-          <p:cNvSpPr txBox="1"/>
-          <p:nvPr/>
-        </p:nvSpPr>
-        <p:spPr>
-          <a:xfrm>
-            <a:off x="572580" y="552387"/>
-            <a:ext cx="4602735" cy="215444"/>
-          </a:xfrm>
-          <a:prstGeom prst="rect">
-            <a:avLst/>
-          </a:prstGeom>
-          <a:noFill/>
-        </p:spPr>
-        <p:txBody>
-          <a:bodyPr wrap="square" rtlCol="0">
-            <a:spAutoFit/>
-          </a:bodyPr>
-          <a:lstStyle/>
-          <a:p>
-            <a:r>
-              <a:rPr lang="en-US" sz="1000" b="0" dirty="0">
-                <a:solidFill>
-                  <a:srgbClr val="01B4D2"/>
-                </a:solidFill>
-                <a:latin typeface="Brandon Grotesque Bold" charset="0"/>
-              </a:rPr>
-              <a:t>Docker for Windows</a:t>
+              <a:t>QA</a:t>
             </a:r>
           </a:p>
         </p:txBody>
@@ -21375,7 +20247,7 @@
     </p:spTree>
     <p:extLst>
       <p:ext uri="{BB962C8B-B14F-4D97-AF65-F5344CB8AC3E}">
-        <p14:creationId xmlns:p14="http://schemas.microsoft.com/office/powerpoint/2010/main" val="2105763634"/>
+        <p14:creationId xmlns:p14="http://schemas.microsoft.com/office/powerpoint/2010/main" val="841428424"/>
       </p:ext>
     </p:extLst>
   </p:cSld>
@@ -23013,43 +21885,6 @@
 </file>
 
 <file path=customXml/item2.xml><?xml version="1.0" encoding="utf-8"?>
-<p:properties xmlns:p="http://schemas.microsoft.com/office/2006/metadata/properties" xmlns:xsi="http://www.w3.org/2001/XMLSchema-instance" xmlns:pc="http://schemas.microsoft.com/office/infopath/2007/PartnerControls">
-  <documentManagement>
-    <l0f7e19ec1594d27a99d490bfb206580 xmlns="408c36b6-0318-410e-af21-94a91ba4a872">
-      <Terms xmlns="http://schemas.microsoft.com/office/infopath/2007/PartnerControls">
-        <TermInfo xmlns="http://schemas.microsoft.com/office/infopath/2007/PartnerControls">
-          <TermName xmlns="http://schemas.microsoft.com/office/infopath/2007/PartnerControls">brand</TermName>
-          <TermId xmlns="http://schemas.microsoft.com/office/infopath/2007/PartnerControls">46040647-617f-47c3-982a-9fde6022b150</TermId>
-        </TermInfo>
-        <TermInfo xmlns="http://schemas.microsoft.com/office/infopath/2007/PartnerControls">
-          <TermName xmlns="http://schemas.microsoft.com/office/infopath/2007/PartnerControls">brand pantry</TermName>
-          <TermId xmlns="http://schemas.microsoft.com/office/infopath/2007/PartnerControls">19fb909d-09c6-4c73-b71b-e1c9ecd3d01e</TermId>
-        </TermInfo>
-        <TermInfo xmlns="http://schemas.microsoft.com/office/infopath/2007/PartnerControls">
-          <TermName xmlns="http://schemas.microsoft.com/office/infopath/2007/PartnerControls">marketing</TermName>
-          <TermId xmlns="http://schemas.microsoft.com/office/infopath/2007/PartnerControls">e5957296-3621-46bb-8290-04e3e67c64ed</TermId>
-        </TermInfo>
-      </Terms>
-    </l0f7e19ec1594d27a99d490bfb206580>
-    <TaxCatchAll xmlns="408c36b6-0318-410e-af21-94a91ba4a872">
-      <Value>123</Value>
-      <Value>122</Value>
-      <Value>121</Value>
-    </TaxCatchAll>
-    <UnilyIsTemplate xmlns="408c36b6-0318-410e-af21-94a91ba4a872">false</UnilyIsTemplate>
-    <UnilyIsFeaturedDocument xmlns="408c36b6-0318-410e-af21-94a91ba4a872">false</UnilyIsFeaturedDocument>
-    <SharedWithUsers xmlns="408c36b6-0318-410e-af21-94a91ba4a872">
-      <UserInfo>
-        <DisplayName>Stephen Stanton</DisplayName>
-        <AccountId>158</AccountId>
-        <AccountType/>
-      </UserInfo>
-    </SharedWithUsers>
-  </documentManagement>
-</p:properties>
-</file>
-
-<file path=customXml/item3.xml><?xml version="1.0" encoding="utf-8"?>
 <ct:contentTypeSchema xmlns:ct="http://schemas.microsoft.com/office/2006/metadata/contentType" xmlns:ma="http://schemas.microsoft.com/office/2006/metadata/properties/metaAttributes" ct:_="" ma:_="" ma:contentTypeName="Document" ma:contentTypeID="0x010100526267BDC092EB4489FBF4CA1503D578" ma:contentTypeVersion="6" ma:contentTypeDescription="Create a new document." ma:contentTypeScope="" ma:versionID="98cd9d25a9be38f4241acf3804011239">
   <xsd:schema xmlns:xsd="http://www.w3.org/2001/XMLSchema" xmlns:xs="http://www.w3.org/2001/XMLSchema" xmlns:p="http://schemas.microsoft.com/office/2006/metadata/properties" xmlns:ns2="408c36b6-0318-410e-af21-94a91ba4a872" xmlns:ns3="5a56c1ce-266b-4241-ad6e-da11d2d4deb0" targetNamespace="http://schemas.microsoft.com/office/2006/metadata/properties" ma:root="true" ma:fieldsID="1780b6ab19440e5559ad2d2341a4aa22" ns2:_="" ns3:_="">
     <xsd:import namespace="408c36b6-0318-410e-af21-94a91ba4a872"/>
@@ -23270,6 +22105,43 @@
 </ct:contentTypeSchema>
 </file>
 
+<file path=customXml/item3.xml><?xml version="1.0" encoding="utf-8"?>
+<p:properties xmlns:p="http://schemas.microsoft.com/office/2006/metadata/properties" xmlns:xsi="http://www.w3.org/2001/XMLSchema-instance" xmlns:pc="http://schemas.microsoft.com/office/infopath/2007/PartnerControls">
+  <documentManagement>
+    <l0f7e19ec1594d27a99d490bfb206580 xmlns="408c36b6-0318-410e-af21-94a91ba4a872">
+      <Terms xmlns="http://schemas.microsoft.com/office/infopath/2007/PartnerControls">
+        <TermInfo xmlns="http://schemas.microsoft.com/office/infopath/2007/PartnerControls">
+          <TermName xmlns="http://schemas.microsoft.com/office/infopath/2007/PartnerControls">brand</TermName>
+          <TermId xmlns="http://schemas.microsoft.com/office/infopath/2007/PartnerControls">46040647-617f-47c3-982a-9fde6022b150</TermId>
+        </TermInfo>
+        <TermInfo xmlns="http://schemas.microsoft.com/office/infopath/2007/PartnerControls">
+          <TermName xmlns="http://schemas.microsoft.com/office/infopath/2007/PartnerControls">brand pantry</TermName>
+          <TermId xmlns="http://schemas.microsoft.com/office/infopath/2007/PartnerControls">19fb909d-09c6-4c73-b71b-e1c9ecd3d01e</TermId>
+        </TermInfo>
+        <TermInfo xmlns="http://schemas.microsoft.com/office/infopath/2007/PartnerControls">
+          <TermName xmlns="http://schemas.microsoft.com/office/infopath/2007/PartnerControls">marketing</TermName>
+          <TermId xmlns="http://schemas.microsoft.com/office/infopath/2007/PartnerControls">e5957296-3621-46bb-8290-04e3e67c64ed</TermId>
+        </TermInfo>
+      </Terms>
+    </l0f7e19ec1594d27a99d490bfb206580>
+    <TaxCatchAll xmlns="408c36b6-0318-410e-af21-94a91ba4a872">
+      <Value>123</Value>
+      <Value>122</Value>
+      <Value>121</Value>
+    </TaxCatchAll>
+    <UnilyIsTemplate xmlns="408c36b6-0318-410e-af21-94a91ba4a872">false</UnilyIsTemplate>
+    <UnilyIsFeaturedDocument xmlns="408c36b6-0318-410e-af21-94a91ba4a872">false</UnilyIsFeaturedDocument>
+    <SharedWithUsers xmlns="408c36b6-0318-410e-af21-94a91ba4a872">
+      <UserInfo>
+        <DisplayName>Stephen Stanton</DisplayName>
+        <AccountId>158</AccountId>
+        <AccountType/>
+      </UserInfo>
+    </SharedWithUsers>
+  </documentManagement>
+</p:properties>
+</file>
+
 <file path=customXml/itemProps1.xml><?xml version="1.0" encoding="utf-8"?>
 <ds:datastoreItem xmlns:ds="http://schemas.openxmlformats.org/officeDocument/2006/customXml" ds:itemID="{E670500C-8FE5-47E1-B3B6-528DB7AD41B1}">
   <ds:schemaRefs>
@@ -23279,23 +22151,6 @@
 </file>
 
 <file path=customXml/itemProps2.xml><?xml version="1.0" encoding="utf-8"?>
-<ds:datastoreItem xmlns:ds="http://schemas.openxmlformats.org/officeDocument/2006/customXml" ds:itemID="{EFDF528D-9A71-4501-8F7F-42A998CFC5F4}">
-  <ds:schemaRefs>
-    <ds:schemaRef ds:uri="http://purl.org/dc/dcmitype/"/>
-    <ds:schemaRef ds:uri="5a56c1ce-266b-4241-ad6e-da11d2d4deb0"/>
-    <ds:schemaRef ds:uri="http://purl.org/dc/elements/1.1/"/>
-    <ds:schemaRef ds:uri="http://schemas.microsoft.com/office/2006/metadata/properties"/>
-    <ds:schemaRef ds:uri="408c36b6-0318-410e-af21-94a91ba4a872"/>
-    <ds:schemaRef ds:uri="http://purl.org/dc/terms/"/>
-    <ds:schemaRef ds:uri="http://schemas.microsoft.com/office/2006/documentManagement/types"/>
-    <ds:schemaRef ds:uri="http://schemas.microsoft.com/office/infopath/2007/PartnerControls"/>
-    <ds:schemaRef ds:uri="http://schemas.openxmlformats.org/package/2006/metadata/core-properties"/>
-    <ds:schemaRef ds:uri="http://www.w3.org/XML/1998/namespace"/>
-  </ds:schemaRefs>
-</ds:datastoreItem>
-</file>
-
-<file path=customXml/itemProps3.xml><?xml version="1.0" encoding="utf-8"?>
 <ds:datastoreItem xmlns:ds="http://schemas.openxmlformats.org/officeDocument/2006/customXml" ds:itemID="{67A3A577-A54D-45C4-8AA3-4AA859AD719C}">
   <ds:schemaRefs>
     <ds:schemaRef ds:uri="http://schemas.microsoft.com/office/2006/metadata/contentType"/>
@@ -23312,4 +22167,21 @@
     <ds:schemaRef ds:uri="http://schemas.microsoft.com/internal/obd"/>
   </ds:schemaRefs>
 </ds:datastoreItem>
+</file>
+
+<file path=customXml/itemProps3.xml><?xml version="1.0" encoding="utf-8"?>
+<ds:datastoreItem xmlns:ds="http://schemas.openxmlformats.org/officeDocument/2006/customXml" ds:itemID="{EFDF528D-9A71-4501-8F7F-42A998CFC5F4}">
+  <ds:schemaRefs>
+    <ds:schemaRef ds:uri="http://purl.org/dc/dcmitype/"/>
+    <ds:schemaRef ds:uri="5a56c1ce-266b-4241-ad6e-da11d2d4deb0"/>
+    <ds:schemaRef ds:uri="http://purl.org/dc/elements/1.1/"/>
+    <ds:schemaRef ds:uri="http://schemas.microsoft.com/office/2006/metadata/properties"/>
+    <ds:schemaRef ds:uri="408c36b6-0318-410e-af21-94a91ba4a872"/>
+    <ds:schemaRef ds:uri="http://purl.org/dc/terms/"/>
+    <ds:schemaRef ds:uri="http://schemas.microsoft.com/office/2006/documentManagement/types"/>
+    <ds:schemaRef ds:uri="http://schemas.microsoft.com/office/infopath/2007/PartnerControls"/>
+    <ds:schemaRef ds:uri="http://schemas.openxmlformats.org/package/2006/metadata/core-properties"/>
+    <ds:schemaRef ds:uri="http://www.w3.org/XML/1998/namespace"/>
+  </ds:schemaRefs>
+</ds:datastoreItem>
 </file>
</xml_diff>

<commit_message>
slides and readme updated
</commit_message>
<xml_diff>
--- a/demo-win-container.pptx
+++ b/demo-win-container.pptx
@@ -1525,7 +1525,7 @@
         </a:p>
       </dgm:t>
     </dgm:pt>
-    <dgm:pt modelId="{DC8A51E0-62D6-4CAE-A8FF-18F63A7E17A9}" type="parTrans" cxnId="{89BD0603-A8BF-42BD-91DC-FA0ED4C768A8}">
+    <dgm:pt modelId="{189831F2-835B-48FB-B40F-EA9A74DDCAE3}" type="sibTrans" cxnId="{89BD0603-A8BF-42BD-91DC-FA0ED4C768A8}">
       <dgm:prSet/>
       <dgm:spPr/>
       <dgm:t>
@@ -1536,7 +1536,7 @@
         </a:p>
       </dgm:t>
     </dgm:pt>
-    <dgm:pt modelId="{189831F2-835B-48FB-B40F-EA9A74DDCAE3}" type="sibTrans" cxnId="{89BD0603-A8BF-42BD-91DC-FA0ED4C768A8}">
+    <dgm:pt modelId="{DC8A51E0-62D6-4CAE-A8FF-18F63A7E17A9}" type="parTrans" cxnId="{89BD0603-A8BF-42BD-91DC-FA0ED4C768A8}">
       <dgm:prSet/>
       <dgm:spPr/>
       <dgm:t>
@@ -1606,15 +1606,15 @@
     </dgm:pt>
   </dgm:ptLst>
   <dgm:cxnLst>
+    <dgm:cxn modelId="{3686D764-9835-4399-80DC-420DFFF11A07}" srcId="{9CD1BA45-5CDF-4ECF-9F97-C603AFF4FA7E}" destId="{52D3416D-8D3E-46F2-AD32-9B1D8491E31D}" srcOrd="2" destOrd="0" parTransId="{0FEE0ADD-00CE-4E40-864D-CAD4E9334263}" sibTransId="{E078BC4C-556E-425A-94F4-E62F5366F2AD}"/>
+    <dgm:cxn modelId="{109DE47E-3A77-4869-98FD-E6D6C9631004}" type="presOf" srcId="{52D3416D-8D3E-46F2-AD32-9B1D8491E31D}" destId="{314A1652-E2DE-4BC2-8F9D-FD76FC108826}" srcOrd="0" destOrd="0" presId="urn:microsoft.com/office/officeart/2005/8/layout/vList2"/>
+    <dgm:cxn modelId="{E26FA853-CE37-44E2-A95B-F1607AB1AA7C}" srcId="{9CD1BA45-5CDF-4ECF-9F97-C603AFF4FA7E}" destId="{DF96330E-DF63-477F-BF6E-CEF4812D3609}" srcOrd="1" destOrd="0" parTransId="{8663C956-0F00-48C5-BBF9-8E21547A45B1}" sibTransId="{C01F83FF-5C40-4CCC-89EE-AA81A231AD7C}"/>
     <dgm:cxn modelId="{89BD0603-A8BF-42BD-91DC-FA0ED4C768A8}" srcId="{9CD1BA45-5CDF-4ECF-9F97-C603AFF4FA7E}" destId="{CFAA43BC-8480-4FA5-8823-2B68AF92BE0A}" srcOrd="0" destOrd="0" parTransId="{DC8A51E0-62D6-4CAE-A8FF-18F63A7E17A9}" sibTransId="{189831F2-835B-48FB-B40F-EA9A74DDCAE3}"/>
-    <dgm:cxn modelId="{FB67AC14-6351-4C42-B819-07A92287EF81}" type="presOf" srcId="{DF96330E-DF63-477F-BF6E-CEF4812D3609}" destId="{C9D92DFB-B7E0-411E-87BF-45E399E02961}" srcOrd="0" destOrd="0" presId="urn:microsoft.com/office/officeart/2005/8/layout/vList2"/>
+    <dgm:cxn modelId="{7DC82F90-5028-44CC-9507-32D39D1656C2}" type="presOf" srcId="{9CD1BA45-5CDF-4ECF-9F97-C603AFF4FA7E}" destId="{2666DAA4-A82B-4FC6-9CBB-E5366038A749}" srcOrd="0" destOrd="0" presId="urn:microsoft.com/office/officeart/2005/8/layout/vList2"/>
     <dgm:cxn modelId="{99182C3F-200E-4180-9B34-C9D93CD0576F}" type="presOf" srcId="{CFAA43BC-8480-4FA5-8823-2B68AF92BE0A}" destId="{92DCC94B-3F3C-474B-90AF-D777A1105F57}" srcOrd="0" destOrd="0" presId="urn:microsoft.com/office/officeart/2005/8/layout/vList2"/>
-    <dgm:cxn modelId="{3686D764-9835-4399-80DC-420DFFF11A07}" srcId="{9CD1BA45-5CDF-4ECF-9F97-C603AFF4FA7E}" destId="{52D3416D-8D3E-46F2-AD32-9B1D8491E31D}" srcOrd="2" destOrd="0" parTransId="{0FEE0ADD-00CE-4E40-864D-CAD4E9334263}" sibTransId="{E078BC4C-556E-425A-94F4-E62F5366F2AD}"/>
-    <dgm:cxn modelId="{E26FA853-CE37-44E2-A95B-F1607AB1AA7C}" srcId="{9CD1BA45-5CDF-4ECF-9F97-C603AFF4FA7E}" destId="{DF96330E-DF63-477F-BF6E-CEF4812D3609}" srcOrd="1" destOrd="0" parTransId="{8663C956-0F00-48C5-BBF9-8E21547A45B1}" sibTransId="{C01F83FF-5C40-4CCC-89EE-AA81A231AD7C}"/>
-    <dgm:cxn modelId="{109DE47E-3A77-4869-98FD-E6D6C9631004}" type="presOf" srcId="{52D3416D-8D3E-46F2-AD32-9B1D8491E31D}" destId="{314A1652-E2DE-4BC2-8F9D-FD76FC108826}" srcOrd="0" destOrd="0" presId="urn:microsoft.com/office/officeart/2005/8/layout/vList2"/>
-    <dgm:cxn modelId="{7DC82F90-5028-44CC-9507-32D39D1656C2}" type="presOf" srcId="{9CD1BA45-5CDF-4ECF-9F97-C603AFF4FA7E}" destId="{2666DAA4-A82B-4FC6-9CBB-E5366038A749}" srcOrd="0" destOrd="0" presId="urn:microsoft.com/office/officeart/2005/8/layout/vList2"/>
     <dgm:cxn modelId="{40EE3DCD-DCEF-4325-B137-2F6403B23060}" type="presOf" srcId="{E0748DB7-8F35-413E-BA9B-7A1C1AF7B56A}" destId="{BF949400-2E85-4920-A685-1C44A0D30C9A}" srcOrd="0" destOrd="0" presId="urn:microsoft.com/office/officeart/2005/8/layout/vList2"/>
     <dgm:cxn modelId="{CA73E1D2-6798-426C-BF1D-3F4E60FD391C}" srcId="{9CD1BA45-5CDF-4ECF-9F97-C603AFF4FA7E}" destId="{E0748DB7-8F35-413E-BA9B-7A1C1AF7B56A}" srcOrd="3" destOrd="0" parTransId="{C96EF543-34B1-40AD-AED6-F167016476C1}" sibTransId="{DF18792D-E602-44FD-8FE7-A221810015E5}"/>
+    <dgm:cxn modelId="{FB67AC14-6351-4C42-B819-07A92287EF81}" type="presOf" srcId="{DF96330E-DF63-477F-BF6E-CEF4812D3609}" destId="{C9D92DFB-B7E0-411E-87BF-45E399E02961}" srcOrd="0" destOrd="0" presId="urn:microsoft.com/office/officeart/2005/8/layout/vList2"/>
     <dgm:cxn modelId="{08B1E724-0E4D-48E5-B43B-6FE462367137}" type="presParOf" srcId="{2666DAA4-A82B-4FC6-9CBB-E5366038A749}" destId="{92DCC94B-3F3C-474B-90AF-D777A1105F57}" srcOrd="0" destOrd="0" presId="urn:microsoft.com/office/officeart/2005/8/layout/vList2"/>
     <dgm:cxn modelId="{39F6F3CE-0D44-4D4D-9C19-C92C924F878C}" type="presParOf" srcId="{2666DAA4-A82B-4FC6-9CBB-E5366038A749}" destId="{B8DA694C-3B24-48FF-AF67-F68F07137F32}" srcOrd="1" destOrd="0" presId="urn:microsoft.com/office/officeart/2005/8/layout/vList2"/>
     <dgm:cxn modelId="{A7606084-0E9F-4EF6-ACA0-ADDDECF8A02A}" type="presParOf" srcId="{2666DAA4-A82B-4FC6-9CBB-E5366038A749}" destId="{C9D92DFB-B7E0-411E-87BF-45E399E02961}" srcOrd="2" destOrd="0" presId="urn:microsoft.com/office/officeart/2005/8/layout/vList2"/>
@@ -3276,7 +3276,7 @@
           <a:p>
             <a:fld id="{A2851F6C-2979-744C-B14F-026BDFE8CC90}" type="datetimeFigureOut">
               <a:rPr lang="en-US" smtClean="0"/>
-              <a:t>8/2/2018</a:t>
+              <a:t>8/3/2018</a:t>
             </a:fld>
             <a:endParaRPr lang="en-US"/>
           </a:p>
@@ -4322,7 +4322,7 @@
           <a:p>
             <a:fld id="{C764DE79-268F-4C1A-8933-263129D2AF90}" type="datetimeFigureOut">
               <a:rPr lang="en-US" smtClean="0"/>
-              <a:t>8/2/2018</a:t>
+              <a:t>8/3/2018</a:t>
             </a:fld>
             <a:endParaRPr lang="en-US" dirty="0"/>
           </a:p>
@@ -4526,7 +4526,7 @@
           <a:p>
             <a:fld id="{C764DE79-268F-4C1A-8933-263129D2AF90}" type="datetimeFigureOut">
               <a:rPr lang="en-US" smtClean="0"/>
-              <a:t>8/2/2018</a:t>
+              <a:t>8/3/2018</a:t>
             </a:fld>
             <a:endParaRPr lang="en-US" dirty="0"/>
           </a:p>
@@ -5105,7 +5105,7 @@
           <a:p>
             <a:fld id="{C764DE79-268F-4C1A-8933-263129D2AF90}" type="datetimeFigureOut">
               <a:rPr lang="en-US" smtClean="0"/>
-              <a:t>8/2/2018</a:t>
+              <a:t>8/3/2018</a:t>
             </a:fld>
             <a:endParaRPr lang="en-US" dirty="0"/>
           </a:p>
@@ -8235,7 +8235,7 @@
           <a:p>
             <a:fld id="{C764DE79-268F-4C1A-8933-263129D2AF90}" type="datetimeFigureOut">
               <a:rPr lang="en-US" smtClean="0"/>
-              <a:t>8/2/2018</a:t>
+              <a:t>8/3/2018</a:t>
             </a:fld>
             <a:endParaRPr lang="en-US" dirty="0"/>
           </a:p>
@@ -9954,7 +9954,7 @@
           <a:p>
             <a:fld id="{C764DE79-268F-4C1A-8933-263129D2AF90}" type="datetimeFigureOut">
               <a:rPr lang="en-US" smtClean="0"/>
-              <a:t>8/2/2018</a:t>
+              <a:t>8/3/2018</a:t>
             </a:fld>
             <a:endParaRPr lang="en-US" dirty="0"/>
           </a:p>
@@ -10668,7 +10668,7 @@
           <a:p>
             <a:fld id="{C764DE79-268F-4C1A-8933-263129D2AF90}" type="datetimeFigureOut">
               <a:rPr lang="en-US" dirty="0"/>
-              <a:t>8/2/2018</a:t>
+              <a:t>8/3/2018</a:t>
             </a:fld>
             <a:endParaRPr lang="en-US" dirty="0"/>
           </a:p>
@@ -11238,7 +11238,7 @@
           <a:p>
             <a:fld id="{C764DE79-268F-4C1A-8933-263129D2AF90}" type="datetimeFigureOut">
               <a:rPr lang="en-US" dirty="0"/>
-              <a:t>8/2/2018</a:t>
+              <a:t>8/3/2018</a:t>
             </a:fld>
             <a:endParaRPr lang="en-US" dirty="0"/>
           </a:p>
@@ -11891,7 +11891,7 @@
           <a:p>
             <a:fld id="{C764DE79-268F-4C1A-8933-263129D2AF90}" type="datetimeFigureOut">
               <a:rPr lang="en-US" dirty="0"/>
-              <a:t>8/2/2018</a:t>
+              <a:t>8/3/2018</a:t>
             </a:fld>
             <a:endParaRPr lang="en-US" dirty="0"/>
           </a:p>
@@ -12656,7 +12656,7 @@
           <a:p>
             <a:fld id="{C764DE79-268F-4C1A-8933-263129D2AF90}" type="datetimeFigureOut">
               <a:rPr lang="en-US" dirty="0"/>
-              <a:t>8/2/2018</a:t>
+              <a:t>8/3/2018</a:t>
             </a:fld>
             <a:endParaRPr lang="en-US" dirty="0"/>
           </a:p>
@@ -13106,7 +13106,7 @@
           <a:p>
             <a:fld id="{C764DE79-268F-4C1A-8933-263129D2AF90}" type="datetimeFigureOut">
               <a:rPr lang="en-US" dirty="0"/>
-              <a:t>8/2/2018</a:t>
+              <a:t>8/3/2018</a:t>
             </a:fld>
             <a:endParaRPr lang="en-US" dirty="0"/>
           </a:p>
@@ -13726,7 +13726,7 @@
           <a:p>
             <a:fld id="{C764DE79-268F-4C1A-8933-263129D2AF90}" type="datetimeFigureOut">
               <a:rPr lang="en-US" dirty="0"/>
-              <a:t>8/2/2018</a:t>
+              <a:t>8/3/2018</a:t>
             </a:fld>
             <a:endParaRPr lang="en-US" dirty="0"/>
           </a:p>
@@ -14330,7 +14330,7 @@
           <a:p>
             <a:fld id="{C764DE79-268F-4C1A-8933-263129D2AF90}" type="datetimeFigureOut">
               <a:rPr lang="en-US" dirty="0"/>
-              <a:t>8/2/2018</a:t>
+              <a:t>8/3/2018</a:t>
             </a:fld>
             <a:endParaRPr lang="en-US" dirty="0"/>
           </a:p>
@@ -14966,7 +14966,7 @@
           <a:p>
             <a:fld id="{C764DE79-268F-4C1A-8933-263129D2AF90}" type="datetimeFigureOut">
               <a:rPr lang="en-US" smtClean="0"/>
-              <a:t>8/2/2018</a:t>
+              <a:t>8/3/2018</a:t>
             </a:fld>
             <a:endParaRPr lang="en-US" dirty="0"/>
           </a:p>
@@ -15731,7 +15731,7 @@
           <a:p>
             <a:fld id="{C764DE79-268F-4C1A-8933-263129D2AF90}" type="datetimeFigureOut">
               <a:rPr lang="en-US" smtClean="0"/>
-              <a:t>8/2/2018</a:t>
+              <a:t>8/3/2018</a:t>
             </a:fld>
             <a:endParaRPr lang="en-US" dirty="0"/>
           </a:p>
@@ -16181,7 +16181,7 @@
           <a:p>
             <a:fld id="{C764DE79-268F-4C1A-8933-263129D2AF90}" type="datetimeFigureOut">
               <a:rPr lang="en-US" smtClean="0"/>
-              <a:t>8/2/2018</a:t>
+              <a:t>8/3/2018</a:t>
             </a:fld>
             <a:endParaRPr lang="en-US" dirty="0"/>
           </a:p>
@@ -16631,7 +16631,7 @@
           <a:p>
             <a:fld id="{C764DE79-268F-4C1A-8933-263129D2AF90}" type="datetimeFigureOut">
               <a:rPr lang="en-US" smtClean="0"/>
-              <a:t>8/2/2018</a:t>
+              <a:t>8/3/2018</a:t>
             </a:fld>
             <a:endParaRPr lang="en-US" dirty="0"/>
           </a:p>
@@ -17217,7 +17217,7 @@
           <a:p>
             <a:fld id="{C764DE79-268F-4C1A-8933-263129D2AF90}" type="datetimeFigureOut">
               <a:rPr lang="en-US" smtClean="0"/>
-              <a:t>8/2/2018</a:t>
+              <a:t>8/3/2018</a:t>
             </a:fld>
             <a:endParaRPr lang="en-US" dirty="0"/>
           </a:p>
@@ -17870,7 +17870,7 @@
           <a:p>
             <a:fld id="{C764DE79-268F-4C1A-8933-263129D2AF90}" type="datetimeFigureOut">
               <a:rPr lang="en-US" smtClean="0"/>
-              <a:t>8/2/2018</a:t>
+              <a:t>8/3/2018</a:t>
             </a:fld>
             <a:endParaRPr lang="en-US" dirty="0"/>
           </a:p>
@@ -18438,7 +18438,7 @@
           <a:p>
             <a:fld id="{C764DE79-268F-4C1A-8933-263129D2AF90}" type="datetimeFigureOut">
               <a:rPr lang="en-US" smtClean="0"/>
-              <a:t>8/2/2018</a:t>
+              <a:t>8/3/2018</a:t>
             </a:fld>
             <a:endParaRPr lang="en-US" dirty="0"/>
           </a:p>
@@ -18926,7 +18926,7 @@
           <a:p>
             <a:r>
               <a:rPr lang="en-US" dirty="0"/>
-              <a:t>By: Priyakant Patel</a:t>
+              <a:t>Author: Priyakant Patel</a:t>
             </a:r>
           </a:p>
         </p:txBody>
@@ -19318,89 +19318,92 @@
         </p:nvSpPr>
         <p:spPr>
           <a:xfrm>
-            <a:off x="571351" y="2021837"/>
-            <a:ext cx="10779493" cy="4496383"/>
-          </a:xfrm>
-        </p:spPr>
-        <p:txBody>
-          <a:bodyPr/>
-          <a:lstStyle/>
-          <a:p>
-            <a:r>
-              <a:rPr lang="en-US" dirty="0"/>
-              <a:t>Containers which runs in the windows environment</a:t>
-            </a:r>
-          </a:p>
-          <a:p>
-            <a:pPr marL="0" indent="0">
-              <a:buNone/>
-            </a:pPr>
-            <a:endParaRPr lang="en-US" dirty="0"/>
-          </a:p>
-          <a:p>
-            <a:r>
-              <a:rPr lang="en-US" dirty="0"/>
-              <a:t>Process isolation</a:t>
-            </a:r>
-          </a:p>
-          <a:p>
-            <a:r>
-              <a:rPr lang="en-US" dirty="0"/>
-              <a:t>Scale</a:t>
-            </a:r>
-          </a:p>
-          <a:p>
-            <a:r>
-              <a:rPr lang="en-US" dirty="0"/>
-              <a:t>Resiliency</a:t>
-            </a:r>
-          </a:p>
-          <a:p>
-            <a:r>
-              <a:rPr lang="en-US" dirty="0"/>
-              <a:t>It will work anywhere if it is working on my machine.</a:t>
-            </a:r>
-          </a:p>
-          <a:p>
-            <a:r>
-              <a:rPr lang="en-US" dirty="0"/>
-              <a:t>So we can run the legacy Windows applications in the containers.</a:t>
-            </a:r>
-          </a:p>
-          <a:p>
-            <a:pPr lvl="1"/>
-            <a:r>
-              <a:rPr lang="en-US" dirty="0"/>
-              <a:t>Ex: ASP.NET, WCF, Windows service, etc.</a:t>
-            </a:r>
-          </a:p>
-        </p:txBody>
-      </p:sp>
-      <p:sp>
-        <p:nvSpPr>
-          <p:cNvPr id="2" name="Title 1"/>
-          <p:cNvSpPr>
-            <a:spLocks noGrp="1"/>
-          </p:cNvSpPr>
-          <p:nvPr>
-            <p:ph type="title"/>
-          </p:nvPr>
-        </p:nvSpPr>
-        <p:spPr>
-          <a:xfrm>
-            <a:off x="837982" y="1232451"/>
-            <a:ext cx="10512862" cy="514593"/>
+            <a:off x="571351" y="1025681"/>
+            <a:ext cx="10779493" cy="5514456"/>
           </a:xfrm>
         </p:spPr>
         <p:txBody>
           <a:bodyPr>
-            <a:normAutofit fontScale="90000"/>
+            <a:normAutofit/>
           </a:bodyPr>
           <a:lstStyle/>
           <a:p>
+            <a:pPr marL="0" indent="0">
+              <a:buNone/>
+            </a:pPr>
+            <a:r>
+              <a:rPr lang="en-US" sz="4000" dirty="0">
+                <a:solidFill>
+                  <a:srgbClr val="00B4D2"/>
+                </a:solidFill>
+                <a:latin typeface="Segoe UI Normal" charset="0"/>
+                <a:ea typeface="+mj-ea"/>
+                <a:cs typeface="+mj-cs"/>
+              </a:rPr>
+              <a:t>What is windows container?</a:t>
+            </a:r>
+            <a:endParaRPr lang="en-US" dirty="0"/>
+          </a:p>
+          <a:p>
             <a:r>
               <a:rPr lang="en-US" dirty="0"/>
-              <a:t>What is it and why we need it?</a:t>
+              <a:t>Containers which runs in the windows environment.</a:t>
+            </a:r>
+          </a:p>
+          <a:p>
+            <a:endParaRPr lang="en-US" dirty="0"/>
+          </a:p>
+          <a:p>
+            <a:pPr marL="0" indent="0">
+              <a:buNone/>
+            </a:pPr>
+            <a:r>
+              <a:rPr lang="en-US" sz="4000" dirty="0">
+                <a:solidFill>
+                  <a:srgbClr val="00B4D2"/>
+                </a:solidFill>
+                <a:latin typeface="Segoe UI Normal" charset="0"/>
+                <a:ea typeface="+mj-ea"/>
+                <a:cs typeface="+mj-cs"/>
+              </a:rPr>
+              <a:t>Why we need it?</a:t>
+            </a:r>
+          </a:p>
+          <a:p>
+            <a:r>
+              <a:rPr lang="en-US" dirty="0"/>
+              <a:t>Process isolation</a:t>
+            </a:r>
+          </a:p>
+          <a:p>
+            <a:r>
+              <a:rPr lang="en-US" dirty="0"/>
+              <a:t>Scalability</a:t>
+            </a:r>
+          </a:p>
+          <a:p>
+            <a:r>
+              <a:rPr lang="en-US" dirty="0"/>
+              <a:t>Resiliency</a:t>
+            </a:r>
+          </a:p>
+          <a:p>
+            <a:r>
+              <a:rPr lang="en-US" dirty="0"/>
+              <a:t>It will work if it is working on my machine.</a:t>
+            </a:r>
+          </a:p>
+          <a:p>
+            <a:r>
+              <a:rPr lang="en-US" dirty="0"/>
+              <a:t>So we can run the legacy Windows applications in the containers.</a:t>
+            </a:r>
+          </a:p>
+          <a:p>
+            <a:pPr lvl="1"/>
+            <a:r>
+              <a:rPr lang="en-US" dirty="0"/>
+              <a:t>Ex: ASP.NET, WCF, Windows service, etc.</a:t>
             </a:r>
           </a:p>
         </p:txBody>
@@ -19492,18 +19495,7 @@
             <a:pPr marL="0" indent="0">
               <a:buNone/>
             </a:pPr>
-            <a:r>
-              <a:rPr lang="en-US" dirty="0"/>
-              <a:t>Minimum </a:t>
-            </a:r>
-            <a:r>
-              <a:rPr lang="en-US" dirty="0" err="1"/>
-              <a:t>requirnemnt</a:t>
-            </a:r>
-            <a:r>
-              <a:rPr lang="en-US" dirty="0"/>
-              <a:t>:</a:t>
-            </a:r>
+            <a:endParaRPr lang="en-US" dirty="0"/>
           </a:p>
           <a:p>
             <a:pPr lvl="1"/>
@@ -19836,14 +19828,14 @@
             <a:pPr lvl="0"/>
             <a:r>
               <a:rPr lang="en-US" dirty="0"/>
-              <a:t>Hyper-V Containers - Containers with a dedicated kernel and stronger isolation from other containers</a:t>
+              <a:t>Hyper-V Containers - Containers with a dedicated kernel and stronger isolation from other containers.</a:t>
             </a:r>
           </a:p>
           <a:p>
             <a:pPr lvl="0"/>
             <a:r>
               <a:rPr lang="en-US" dirty="0"/>
-              <a:t>Windows Server Containers - application isolation using process and namespace isolation, and a shared kernel with the container host</a:t>
+              <a:t>Windows Server Containers - application isolation using process and namespace isolation, and a shared kernel with the container host.</a:t>
             </a:r>
           </a:p>
           <a:p>
@@ -20106,26 +20098,20 @@
           <a:p>
             <a:r>
               <a:rPr lang="en-US" dirty="0"/>
-              <a:t>Create security group to hold machines.</a:t>
+              <a:t>Create a security group to hold machines.</a:t>
             </a:r>
           </a:p>
           <a:p>
             <a:r>
               <a:rPr lang="en-US" dirty="0"/>
-              <a:t>Crate service account which can retrieve passwords on machine specified (security group).</a:t>
+              <a:t>Crate service account which can retrieve passwords on the machine specified (security group).</a:t>
             </a:r>
           </a:p>
           <a:p>
             <a:r>
               <a:rPr lang="en-US" dirty="0"/>
-              <a:t>Run container using service account</a:t>
-            </a:r>
-          </a:p>
-          <a:p>
-            <a:pPr marL="0" indent="0">
-              <a:buNone/>
-            </a:pPr>
-            <a:endParaRPr lang="en-US" dirty="0"/>
+              <a:t>Run container using the service account</a:t>
+            </a:r>
           </a:p>
         </p:txBody>
       </p:sp>
@@ -20153,7 +20139,7 @@
           <a:p>
             <a:r>
               <a:rPr lang="en-US" dirty="0"/>
-              <a:t>Service Accounts</a:t>
+              <a:t>Windows authentication</a:t>
             </a:r>
           </a:p>
         </p:txBody>

</xml_diff>